<commit_message>
o updated slides for 2021...
</commit_message>
<xml_diff>
--- a/BattleShip/Get Started Programming Battleship.pptx
+++ b/BattleShip/Get Started Programming Battleship.pptx
@@ -6,21 +6,16 @@
   </p:sldMasterIdLst>
   <p:sldIdLst>
     <p:sldId id="256" r:id="rId2"/>
-    <p:sldId id="257" r:id="rId3"/>
-    <p:sldId id="258" r:id="rId4"/>
-    <p:sldId id="259" r:id="rId5"/>
-    <p:sldId id="260" r:id="rId6"/>
-    <p:sldId id="261" r:id="rId7"/>
-    <p:sldId id="262" r:id="rId8"/>
-    <p:sldId id="263" r:id="rId9"/>
-    <p:sldId id="264" r:id="rId10"/>
-    <p:sldId id="265" r:id="rId11"/>
-    <p:sldId id="266" r:id="rId12"/>
-    <p:sldId id="267" r:id="rId13"/>
-    <p:sldId id="269" r:id="rId14"/>
-    <p:sldId id="268" r:id="rId15"/>
-    <p:sldId id="270" r:id="rId16"/>
-    <p:sldId id="271" r:id="rId17"/>
+    <p:sldId id="262" r:id="rId3"/>
+    <p:sldId id="263" r:id="rId4"/>
+    <p:sldId id="264" r:id="rId5"/>
+    <p:sldId id="265" r:id="rId6"/>
+    <p:sldId id="266" r:id="rId7"/>
+    <p:sldId id="267" r:id="rId8"/>
+    <p:sldId id="269" r:id="rId9"/>
+    <p:sldId id="268" r:id="rId10"/>
+    <p:sldId id="270" r:id="rId11"/>
+    <p:sldId id="271" r:id="rId12"/>
   </p:sldIdLst>
   <p:sldSz cx="12192000" cy="6858000"/>
   <p:notesSz cx="6858000" cy="9144000"/>
@@ -169,10 +164,9 @@
           </a:lstStyle>
           <a:p>
             <a:r>
-              <a:rPr lang="en-US" smtClean="0"/>
+              <a:rPr lang="en-US"/>
               <a:t>Click to edit Master title style</a:t>
             </a:r>
-            <a:endParaRPr lang="en-US"/>
           </a:p>
         </p:txBody>
       </p:sp>
@@ -234,10 +228,9 @@
           </a:lstStyle>
           <a:p>
             <a:r>
-              <a:rPr lang="en-US" smtClean="0"/>
+              <a:rPr lang="en-US"/>
               <a:t>Click to edit Master subtitle style</a:t>
             </a:r>
-            <a:endParaRPr lang="en-US"/>
           </a:p>
         </p:txBody>
       </p:sp>
@@ -258,7 +251,7 @@
           <a:p>
             <a:fld id="{A61F917C-DCE7-419E-8EDA-3349769D2756}" type="datetimeFigureOut">
               <a:rPr lang="en-US" smtClean="0"/>
-              <a:t>9/1/2017</a:t>
+              <a:t>9/13/2021</a:t>
             </a:fld>
             <a:endParaRPr lang="en-US"/>
           </a:p>
@@ -352,10 +345,9 @@
           <a:lstStyle/>
           <a:p>
             <a:r>
-              <a:rPr lang="en-US" smtClean="0"/>
+              <a:rPr lang="en-US"/>
               <a:t>Click to edit Master title style</a:t>
             </a:r>
-            <a:endParaRPr lang="en-US"/>
           </a:p>
         </p:txBody>
       </p:sp>
@@ -376,38 +368,37 @@
           <a:p>
             <a:pPr lvl="0"/>
             <a:r>
-              <a:rPr lang="en-US" smtClean="0"/>
+              <a:rPr lang="en-US"/>
               <a:t>Edit Master text styles</a:t>
             </a:r>
           </a:p>
           <a:p>
             <a:pPr lvl="1"/>
             <a:r>
-              <a:rPr lang="en-US" smtClean="0"/>
+              <a:rPr lang="en-US"/>
               <a:t>Second level</a:t>
             </a:r>
           </a:p>
           <a:p>
             <a:pPr lvl="2"/>
             <a:r>
-              <a:rPr lang="en-US" smtClean="0"/>
+              <a:rPr lang="en-US"/>
               <a:t>Third level</a:t>
             </a:r>
           </a:p>
           <a:p>
             <a:pPr lvl="3"/>
             <a:r>
-              <a:rPr lang="en-US" smtClean="0"/>
+              <a:rPr lang="en-US"/>
               <a:t>Fourth level</a:t>
             </a:r>
           </a:p>
           <a:p>
             <a:pPr lvl="4"/>
             <a:r>
-              <a:rPr lang="en-US" smtClean="0"/>
+              <a:rPr lang="en-US"/>
               <a:t>Fifth level</a:t>
             </a:r>
-            <a:endParaRPr lang="en-US"/>
           </a:p>
         </p:txBody>
       </p:sp>
@@ -428,7 +419,7 @@
           <a:p>
             <a:fld id="{A61F917C-DCE7-419E-8EDA-3349769D2756}" type="datetimeFigureOut">
               <a:rPr lang="en-US" smtClean="0"/>
-              <a:t>9/1/2017</a:t>
+              <a:t>9/13/2021</a:t>
             </a:fld>
             <a:endParaRPr lang="en-US"/>
           </a:p>
@@ -527,10 +518,9 @@
           <a:lstStyle/>
           <a:p>
             <a:r>
-              <a:rPr lang="en-US" smtClean="0"/>
+              <a:rPr lang="en-US"/>
               <a:t>Click to edit Master title style</a:t>
             </a:r>
-            <a:endParaRPr lang="en-US"/>
           </a:p>
         </p:txBody>
       </p:sp>
@@ -556,38 +546,37 @@
           <a:p>
             <a:pPr lvl="0"/>
             <a:r>
-              <a:rPr lang="en-US" smtClean="0"/>
+              <a:rPr lang="en-US"/>
               <a:t>Edit Master text styles</a:t>
             </a:r>
           </a:p>
           <a:p>
             <a:pPr lvl="1"/>
             <a:r>
-              <a:rPr lang="en-US" smtClean="0"/>
+              <a:rPr lang="en-US"/>
               <a:t>Second level</a:t>
             </a:r>
           </a:p>
           <a:p>
             <a:pPr lvl="2"/>
             <a:r>
-              <a:rPr lang="en-US" smtClean="0"/>
+              <a:rPr lang="en-US"/>
               <a:t>Third level</a:t>
             </a:r>
           </a:p>
           <a:p>
             <a:pPr lvl="3"/>
             <a:r>
-              <a:rPr lang="en-US" smtClean="0"/>
+              <a:rPr lang="en-US"/>
               <a:t>Fourth level</a:t>
             </a:r>
           </a:p>
           <a:p>
             <a:pPr lvl="4"/>
             <a:r>
-              <a:rPr lang="en-US" smtClean="0"/>
+              <a:rPr lang="en-US"/>
               <a:t>Fifth level</a:t>
             </a:r>
-            <a:endParaRPr lang="en-US"/>
           </a:p>
         </p:txBody>
       </p:sp>
@@ -608,7 +597,7 @@
           <a:p>
             <a:fld id="{A61F917C-DCE7-419E-8EDA-3349769D2756}" type="datetimeFigureOut">
               <a:rPr lang="en-US" smtClean="0"/>
-              <a:t>9/1/2017</a:t>
+              <a:t>9/13/2021</a:t>
             </a:fld>
             <a:endParaRPr lang="en-US"/>
           </a:p>
@@ -702,10 +691,9 @@
           <a:lstStyle/>
           <a:p>
             <a:r>
-              <a:rPr lang="en-US" smtClean="0"/>
+              <a:rPr lang="en-US"/>
               <a:t>Click to edit Master title style</a:t>
             </a:r>
-            <a:endParaRPr lang="en-US"/>
           </a:p>
         </p:txBody>
       </p:sp>
@@ -726,38 +714,37 @@
           <a:p>
             <a:pPr lvl="0"/>
             <a:r>
-              <a:rPr lang="en-US" smtClean="0"/>
+              <a:rPr lang="en-US"/>
               <a:t>Edit Master text styles</a:t>
             </a:r>
           </a:p>
           <a:p>
             <a:pPr lvl="1"/>
             <a:r>
-              <a:rPr lang="en-US" smtClean="0"/>
+              <a:rPr lang="en-US"/>
               <a:t>Second level</a:t>
             </a:r>
           </a:p>
           <a:p>
             <a:pPr lvl="2"/>
             <a:r>
-              <a:rPr lang="en-US" smtClean="0"/>
+              <a:rPr lang="en-US"/>
               <a:t>Third level</a:t>
             </a:r>
           </a:p>
           <a:p>
             <a:pPr lvl="3"/>
             <a:r>
-              <a:rPr lang="en-US" smtClean="0"/>
+              <a:rPr lang="en-US"/>
               <a:t>Fourth level</a:t>
             </a:r>
           </a:p>
           <a:p>
             <a:pPr lvl="4"/>
             <a:r>
-              <a:rPr lang="en-US" smtClean="0"/>
+              <a:rPr lang="en-US"/>
               <a:t>Fifth level</a:t>
             </a:r>
-            <a:endParaRPr lang="en-US"/>
           </a:p>
         </p:txBody>
       </p:sp>
@@ -778,7 +765,7 @@
           <a:p>
             <a:fld id="{A61F917C-DCE7-419E-8EDA-3349769D2756}" type="datetimeFigureOut">
               <a:rPr lang="en-US" smtClean="0"/>
-              <a:t>9/1/2017</a:t>
+              <a:t>9/13/2021</a:t>
             </a:fld>
             <a:endParaRPr lang="en-US"/>
           </a:p>
@@ -881,10 +868,9 @@
           </a:lstStyle>
           <a:p>
             <a:r>
-              <a:rPr lang="en-US" smtClean="0"/>
+              <a:rPr lang="en-US"/>
               <a:t>Click to edit Master title style</a:t>
             </a:r>
-            <a:endParaRPr lang="en-US"/>
           </a:p>
         </p:txBody>
       </p:sp>
@@ -1001,7 +987,7 @@
           <a:p>
             <a:pPr lvl="0"/>
             <a:r>
-              <a:rPr lang="en-US" smtClean="0"/>
+              <a:rPr lang="en-US"/>
               <a:t>Edit Master text styles</a:t>
             </a:r>
           </a:p>
@@ -1024,7 +1010,7 @@
           <a:p>
             <a:fld id="{A61F917C-DCE7-419E-8EDA-3349769D2756}" type="datetimeFigureOut">
               <a:rPr lang="en-US" smtClean="0"/>
-              <a:t>9/1/2017</a:t>
+              <a:t>9/13/2021</a:t>
             </a:fld>
             <a:endParaRPr lang="en-US"/>
           </a:p>
@@ -1118,10 +1104,9 @@
           <a:lstStyle/>
           <a:p>
             <a:r>
-              <a:rPr lang="en-US" smtClean="0"/>
+              <a:rPr lang="en-US"/>
               <a:t>Click to edit Master title style</a:t>
             </a:r>
-            <a:endParaRPr lang="en-US"/>
           </a:p>
         </p:txBody>
       </p:sp>
@@ -1147,38 +1132,37 @@
           <a:p>
             <a:pPr lvl="0"/>
             <a:r>
-              <a:rPr lang="en-US" smtClean="0"/>
+              <a:rPr lang="en-US"/>
               <a:t>Edit Master text styles</a:t>
             </a:r>
           </a:p>
           <a:p>
             <a:pPr lvl="1"/>
             <a:r>
-              <a:rPr lang="en-US" smtClean="0"/>
+              <a:rPr lang="en-US"/>
               <a:t>Second level</a:t>
             </a:r>
           </a:p>
           <a:p>
             <a:pPr lvl="2"/>
             <a:r>
-              <a:rPr lang="en-US" smtClean="0"/>
+              <a:rPr lang="en-US"/>
               <a:t>Third level</a:t>
             </a:r>
           </a:p>
           <a:p>
             <a:pPr lvl="3"/>
             <a:r>
-              <a:rPr lang="en-US" smtClean="0"/>
+              <a:rPr lang="en-US"/>
               <a:t>Fourth level</a:t>
             </a:r>
           </a:p>
           <a:p>
             <a:pPr lvl="4"/>
             <a:r>
-              <a:rPr lang="en-US" smtClean="0"/>
+              <a:rPr lang="en-US"/>
               <a:t>Fifth level</a:t>
             </a:r>
-            <a:endParaRPr lang="en-US"/>
           </a:p>
         </p:txBody>
       </p:sp>
@@ -1204,38 +1188,37 @@
           <a:p>
             <a:pPr lvl="0"/>
             <a:r>
-              <a:rPr lang="en-US" smtClean="0"/>
+              <a:rPr lang="en-US"/>
               <a:t>Edit Master text styles</a:t>
             </a:r>
           </a:p>
           <a:p>
             <a:pPr lvl="1"/>
             <a:r>
-              <a:rPr lang="en-US" smtClean="0"/>
+              <a:rPr lang="en-US"/>
               <a:t>Second level</a:t>
             </a:r>
           </a:p>
           <a:p>
             <a:pPr lvl="2"/>
             <a:r>
-              <a:rPr lang="en-US" smtClean="0"/>
+              <a:rPr lang="en-US"/>
               <a:t>Third level</a:t>
             </a:r>
           </a:p>
           <a:p>
             <a:pPr lvl="3"/>
             <a:r>
-              <a:rPr lang="en-US" smtClean="0"/>
+              <a:rPr lang="en-US"/>
               <a:t>Fourth level</a:t>
             </a:r>
           </a:p>
           <a:p>
             <a:pPr lvl="4"/>
             <a:r>
-              <a:rPr lang="en-US" smtClean="0"/>
+              <a:rPr lang="en-US"/>
               <a:t>Fifth level</a:t>
             </a:r>
-            <a:endParaRPr lang="en-US"/>
           </a:p>
         </p:txBody>
       </p:sp>
@@ -1256,7 +1239,7 @@
           <a:p>
             <a:fld id="{A61F917C-DCE7-419E-8EDA-3349769D2756}" type="datetimeFigureOut">
               <a:rPr lang="en-US" smtClean="0"/>
-              <a:t>9/1/2017</a:t>
+              <a:t>9/13/2021</a:t>
             </a:fld>
             <a:endParaRPr lang="en-US"/>
           </a:p>
@@ -1355,10 +1338,9 @@
           <a:lstStyle/>
           <a:p>
             <a:r>
-              <a:rPr lang="en-US" smtClean="0"/>
+              <a:rPr lang="en-US"/>
               <a:t>Click to edit Master title style</a:t>
             </a:r>
-            <a:endParaRPr lang="en-US"/>
           </a:p>
         </p:txBody>
       </p:sp>
@@ -1421,7 +1403,7 @@
           <a:p>
             <a:pPr lvl="0"/>
             <a:r>
-              <a:rPr lang="en-US" smtClean="0"/>
+              <a:rPr lang="en-US"/>
               <a:t>Edit Master text styles</a:t>
             </a:r>
           </a:p>
@@ -1449,38 +1431,37 @@
           <a:p>
             <a:pPr lvl="0"/>
             <a:r>
-              <a:rPr lang="en-US" smtClean="0"/>
+              <a:rPr lang="en-US"/>
               <a:t>Edit Master text styles</a:t>
             </a:r>
           </a:p>
           <a:p>
             <a:pPr lvl="1"/>
             <a:r>
-              <a:rPr lang="en-US" smtClean="0"/>
+              <a:rPr lang="en-US"/>
               <a:t>Second level</a:t>
             </a:r>
           </a:p>
           <a:p>
             <a:pPr lvl="2"/>
             <a:r>
-              <a:rPr lang="en-US" smtClean="0"/>
+              <a:rPr lang="en-US"/>
               <a:t>Third level</a:t>
             </a:r>
           </a:p>
           <a:p>
             <a:pPr lvl="3"/>
             <a:r>
-              <a:rPr lang="en-US" smtClean="0"/>
+              <a:rPr lang="en-US"/>
               <a:t>Fourth level</a:t>
             </a:r>
           </a:p>
           <a:p>
             <a:pPr lvl="4"/>
             <a:r>
-              <a:rPr lang="en-US" smtClean="0"/>
+              <a:rPr lang="en-US"/>
               <a:t>Fifth level</a:t>
             </a:r>
-            <a:endParaRPr lang="en-US"/>
           </a:p>
         </p:txBody>
       </p:sp>
@@ -1543,7 +1524,7 @@
           <a:p>
             <a:pPr lvl="0"/>
             <a:r>
-              <a:rPr lang="en-US" smtClean="0"/>
+              <a:rPr lang="en-US"/>
               <a:t>Edit Master text styles</a:t>
             </a:r>
           </a:p>
@@ -1571,38 +1552,37 @@
           <a:p>
             <a:pPr lvl="0"/>
             <a:r>
-              <a:rPr lang="en-US" smtClean="0"/>
+              <a:rPr lang="en-US"/>
               <a:t>Edit Master text styles</a:t>
             </a:r>
           </a:p>
           <a:p>
             <a:pPr lvl="1"/>
             <a:r>
-              <a:rPr lang="en-US" smtClean="0"/>
+              <a:rPr lang="en-US"/>
               <a:t>Second level</a:t>
             </a:r>
           </a:p>
           <a:p>
             <a:pPr lvl="2"/>
             <a:r>
-              <a:rPr lang="en-US" smtClean="0"/>
+              <a:rPr lang="en-US"/>
               <a:t>Third level</a:t>
             </a:r>
           </a:p>
           <a:p>
             <a:pPr lvl="3"/>
             <a:r>
-              <a:rPr lang="en-US" smtClean="0"/>
+              <a:rPr lang="en-US"/>
               <a:t>Fourth level</a:t>
             </a:r>
           </a:p>
           <a:p>
             <a:pPr lvl="4"/>
             <a:r>
-              <a:rPr lang="en-US" smtClean="0"/>
+              <a:rPr lang="en-US"/>
               <a:t>Fifth level</a:t>
             </a:r>
-            <a:endParaRPr lang="en-US"/>
           </a:p>
         </p:txBody>
       </p:sp>
@@ -1623,7 +1603,7 @@
           <a:p>
             <a:fld id="{A61F917C-DCE7-419E-8EDA-3349769D2756}" type="datetimeFigureOut">
               <a:rPr lang="en-US" smtClean="0"/>
-              <a:t>9/1/2017</a:t>
+              <a:t>9/13/2021</a:t>
             </a:fld>
             <a:endParaRPr lang="en-US"/>
           </a:p>
@@ -1717,10 +1697,9 @@
           <a:lstStyle/>
           <a:p>
             <a:r>
-              <a:rPr lang="en-US" smtClean="0"/>
+              <a:rPr lang="en-US"/>
               <a:t>Click to edit Master title style</a:t>
             </a:r>
-            <a:endParaRPr lang="en-US"/>
           </a:p>
         </p:txBody>
       </p:sp>
@@ -1741,7 +1720,7 @@
           <a:p>
             <a:fld id="{A61F917C-DCE7-419E-8EDA-3349769D2756}" type="datetimeFigureOut">
               <a:rPr lang="en-US" smtClean="0"/>
-              <a:t>9/1/2017</a:t>
+              <a:t>9/13/2021</a:t>
             </a:fld>
             <a:endParaRPr lang="en-US"/>
           </a:p>
@@ -1836,7 +1815,7 @@
           <a:p>
             <a:fld id="{A61F917C-DCE7-419E-8EDA-3349769D2756}" type="datetimeFigureOut">
               <a:rPr lang="en-US" smtClean="0"/>
-              <a:t>9/1/2017</a:t>
+              <a:t>9/13/2021</a:t>
             </a:fld>
             <a:endParaRPr lang="en-US"/>
           </a:p>
@@ -1939,10 +1918,9 @@
           </a:lstStyle>
           <a:p>
             <a:r>
-              <a:rPr lang="en-US" smtClean="0"/>
+              <a:rPr lang="en-US"/>
               <a:t>Click to edit Master title style</a:t>
             </a:r>
-            <a:endParaRPr lang="en-US"/>
           </a:p>
         </p:txBody>
       </p:sp>
@@ -1996,38 +1974,37 @@
           <a:p>
             <a:pPr lvl="0"/>
             <a:r>
-              <a:rPr lang="en-US" smtClean="0"/>
+              <a:rPr lang="en-US"/>
               <a:t>Edit Master text styles</a:t>
             </a:r>
           </a:p>
           <a:p>
             <a:pPr lvl="1"/>
             <a:r>
-              <a:rPr lang="en-US" smtClean="0"/>
+              <a:rPr lang="en-US"/>
               <a:t>Second level</a:t>
             </a:r>
           </a:p>
           <a:p>
             <a:pPr lvl="2"/>
             <a:r>
-              <a:rPr lang="en-US" smtClean="0"/>
+              <a:rPr lang="en-US"/>
               <a:t>Third level</a:t>
             </a:r>
           </a:p>
           <a:p>
             <a:pPr lvl="3"/>
             <a:r>
-              <a:rPr lang="en-US" smtClean="0"/>
+              <a:rPr lang="en-US"/>
               <a:t>Fourth level</a:t>
             </a:r>
           </a:p>
           <a:p>
             <a:pPr lvl="4"/>
             <a:r>
-              <a:rPr lang="en-US" smtClean="0"/>
+              <a:rPr lang="en-US"/>
               <a:t>Fifth level</a:t>
             </a:r>
-            <a:endParaRPr lang="en-US"/>
           </a:p>
         </p:txBody>
       </p:sp>
@@ -2090,7 +2067,7 @@
           <a:p>
             <a:pPr lvl="0"/>
             <a:r>
-              <a:rPr lang="en-US" smtClean="0"/>
+              <a:rPr lang="en-US"/>
               <a:t>Edit Master text styles</a:t>
             </a:r>
           </a:p>
@@ -2113,7 +2090,7 @@
           <a:p>
             <a:fld id="{A61F917C-DCE7-419E-8EDA-3349769D2756}" type="datetimeFigureOut">
               <a:rPr lang="en-US" smtClean="0"/>
-              <a:t>9/1/2017</a:t>
+              <a:t>9/13/2021</a:t>
             </a:fld>
             <a:endParaRPr lang="en-US"/>
           </a:p>
@@ -2216,10 +2193,9 @@
           </a:lstStyle>
           <a:p>
             <a:r>
-              <a:rPr lang="en-US" smtClean="0"/>
+              <a:rPr lang="en-US"/>
               <a:t>Click to edit Master title style</a:t>
             </a:r>
-            <a:endParaRPr lang="en-US"/>
           </a:p>
         </p:txBody>
       </p:sp>
@@ -2343,7 +2319,7 @@
           <a:p>
             <a:pPr lvl="0"/>
             <a:r>
-              <a:rPr lang="en-US" smtClean="0"/>
+              <a:rPr lang="en-US"/>
               <a:t>Edit Master text styles</a:t>
             </a:r>
           </a:p>
@@ -2366,7 +2342,7 @@
           <a:p>
             <a:fld id="{A61F917C-DCE7-419E-8EDA-3349769D2756}" type="datetimeFigureOut">
               <a:rPr lang="en-US" smtClean="0"/>
-              <a:t>9/1/2017</a:t>
+              <a:t>9/13/2021</a:t>
             </a:fld>
             <a:endParaRPr lang="en-US"/>
           </a:p>
@@ -2475,10 +2451,9 @@
           <a:lstStyle/>
           <a:p>
             <a:r>
-              <a:rPr lang="en-US" smtClean="0"/>
+              <a:rPr lang="en-US"/>
               <a:t>Click to edit Master title style</a:t>
             </a:r>
-            <a:endParaRPr lang="en-US"/>
           </a:p>
         </p:txBody>
       </p:sp>
@@ -2509,38 +2484,37 @@
           <a:p>
             <a:pPr lvl="0"/>
             <a:r>
-              <a:rPr lang="en-US" smtClean="0"/>
+              <a:rPr lang="en-US"/>
               <a:t>Edit Master text styles</a:t>
             </a:r>
           </a:p>
           <a:p>
             <a:pPr lvl="1"/>
             <a:r>
-              <a:rPr lang="en-US" smtClean="0"/>
+              <a:rPr lang="en-US"/>
               <a:t>Second level</a:t>
             </a:r>
           </a:p>
           <a:p>
             <a:pPr lvl="2"/>
             <a:r>
-              <a:rPr lang="en-US" smtClean="0"/>
+              <a:rPr lang="en-US"/>
               <a:t>Third level</a:t>
             </a:r>
           </a:p>
           <a:p>
             <a:pPr lvl="3"/>
             <a:r>
-              <a:rPr lang="en-US" smtClean="0"/>
+              <a:rPr lang="en-US"/>
               <a:t>Fourth level</a:t>
             </a:r>
           </a:p>
           <a:p>
             <a:pPr lvl="4"/>
             <a:r>
-              <a:rPr lang="en-US" smtClean="0"/>
+              <a:rPr lang="en-US"/>
               <a:t>Fifth level</a:t>
             </a:r>
-            <a:endParaRPr lang="en-US"/>
           </a:p>
         </p:txBody>
       </p:sp>
@@ -2579,7 +2553,7 @@
           <a:p>
             <a:fld id="{A61F917C-DCE7-419E-8EDA-3349769D2756}" type="datetimeFigureOut">
               <a:rPr lang="en-US" smtClean="0"/>
-              <a:t>9/1/2017</a:t>
+              <a:t>9/13/2021</a:t>
             </a:fld>
             <a:endParaRPr lang="en-US"/>
           </a:p>
@@ -3000,10 +2974,9 @@
           <a:lstStyle/>
           <a:p>
             <a:r>
-              <a:rPr lang="en-US" dirty="0" smtClean="0"/>
+              <a:rPr lang="en-US" dirty="0"/>
               <a:t>CSCE 093</a:t>
             </a:r>
-            <a:endParaRPr lang="en-US" dirty="0"/>
           </a:p>
         </p:txBody>
       </p:sp>
@@ -3023,11 +2996,11 @@
           <a:lstStyle/>
           <a:p>
             <a:r>
-              <a:rPr lang="en-US" dirty="0" err="1" smtClean="0"/>
+              <a:rPr lang="en-US" dirty="0" err="1"/>
               <a:t>BattleShip</a:t>
             </a:r>
             <a:r>
-              <a:rPr lang="en-US" dirty="0" smtClean="0"/>
+              <a:rPr lang="en-US" dirty="0"/>
               <a:t> Coding Project – Get Started</a:t>
             </a:r>
           </a:p>
@@ -3079,10 +3052,476 @@
           <a:lstStyle/>
           <a:p>
             <a:r>
-              <a:rPr lang="en-US" dirty="0" smtClean="0"/>
+              <a:rPr lang="en-US" dirty="0"/>
+              <a:t>On Your Own</a:t>
+            </a:r>
+          </a:p>
+        </p:txBody>
+      </p:sp>
+      <p:sp>
+        <p:nvSpPr>
+          <p:cNvPr id="3" name="Content Placeholder 2"/>
+          <p:cNvSpPr>
+            <a:spLocks noGrp="1"/>
+          </p:cNvSpPr>
+          <p:nvPr>
+            <p:ph idx="1"/>
+          </p:nvPr>
+        </p:nvSpPr>
+        <p:spPr/>
+        <p:txBody>
+          <a:bodyPr/>
+          <a:lstStyle/>
+          <a:p>
+            <a:r>
+              <a:rPr lang="en-US" dirty="0"/>
+              <a:t>Complete the code skeleton to make your own Battleship server that lets two player interactively compete against one another simultaneously!</a:t>
+            </a:r>
+          </a:p>
+          <a:p>
+            <a:r>
+              <a:rPr lang="en-US" dirty="0"/>
+              <a:t>Since it’s networked, you can play this across the internet!</a:t>
+            </a:r>
+          </a:p>
+        </p:txBody>
+      </p:sp>
+    </p:spTree>
+    <p:extLst>
+      <p:ext uri="{BB962C8B-B14F-4D97-AF65-F5344CB8AC3E}">
+        <p14:creationId xmlns:p14="http://schemas.microsoft.com/office/powerpoint/2010/main" val="4070163623"/>
+      </p:ext>
+    </p:extLst>
+  </p:cSld>
+  <p:clrMapOvr>
+    <a:masterClrMapping/>
+  </p:clrMapOvr>
+</p:sld>
+</file>
+
+<file path=ppt/slides/slide11.xml><?xml version="1.0" encoding="utf-8"?>
+<p:sld xmlns:a="http://schemas.openxmlformats.org/drawingml/2006/main" xmlns:r="http://schemas.openxmlformats.org/officeDocument/2006/relationships" xmlns:p="http://schemas.openxmlformats.org/presentationml/2006/main">
+  <p:cSld>
+    <p:spTree>
+      <p:nvGrpSpPr>
+        <p:cNvPr id="1" name=""/>
+        <p:cNvGrpSpPr/>
+        <p:nvPr/>
+      </p:nvGrpSpPr>
+      <p:grpSpPr>
+        <a:xfrm>
+          <a:off x="0" y="0"/>
+          <a:ext cx="0" cy="0"/>
+          <a:chOff x="0" y="0"/>
+          <a:chExt cx="0" cy="0"/>
+        </a:xfrm>
+      </p:grpSpPr>
+      <p:sp>
+        <p:nvSpPr>
+          <p:cNvPr id="2" name="Title 1"/>
+          <p:cNvSpPr>
+            <a:spLocks noGrp="1"/>
+          </p:cNvSpPr>
+          <p:nvPr>
+            <p:ph type="title"/>
+          </p:nvPr>
+        </p:nvSpPr>
+        <p:spPr/>
+        <p:txBody>
+          <a:bodyPr/>
+          <a:lstStyle/>
+          <a:p>
+            <a:r>
+              <a:rPr lang="en-US" dirty="0"/>
+              <a:t>Python</a:t>
+            </a:r>
+          </a:p>
+        </p:txBody>
+      </p:sp>
+      <p:sp>
+        <p:nvSpPr>
+          <p:cNvPr id="3" name="Content Placeholder 2"/>
+          <p:cNvSpPr>
+            <a:spLocks noGrp="1"/>
+          </p:cNvSpPr>
+          <p:nvPr>
+            <p:ph idx="1"/>
+          </p:nvPr>
+        </p:nvSpPr>
+        <p:spPr/>
+        <p:txBody>
+          <a:bodyPr/>
+          <a:lstStyle/>
+          <a:p>
+            <a:r>
+              <a:rPr lang="en-US" dirty="0"/>
+              <a:t>After Battleship, Go through the python slides, too!</a:t>
+            </a:r>
+          </a:p>
+          <a:p>
+            <a:r>
+              <a:rPr lang="en-US" dirty="0"/>
+              <a:t>Use Python to write a regular expression tool that can refactor.py the input in </a:t>
+            </a:r>
+            <a:r>
+              <a:rPr lang="en-US"/>
+              <a:t>/python/refactor/test</a:t>
+            </a:r>
+          </a:p>
+          <a:p>
+            <a:endParaRPr lang="en-US"/>
+          </a:p>
+        </p:txBody>
+      </p:sp>
+    </p:spTree>
+    <p:extLst>
+      <p:ext uri="{BB962C8B-B14F-4D97-AF65-F5344CB8AC3E}">
+        <p14:creationId xmlns:p14="http://schemas.microsoft.com/office/powerpoint/2010/main" val="1226953482"/>
+      </p:ext>
+    </p:extLst>
+  </p:cSld>
+  <p:clrMapOvr>
+    <a:masterClrMapping/>
+  </p:clrMapOvr>
+</p:sld>
+</file>
+
+<file path=ppt/slides/slide2.xml><?xml version="1.0" encoding="utf-8"?>
+<p:sld xmlns:a="http://schemas.openxmlformats.org/drawingml/2006/main" xmlns:r="http://schemas.openxmlformats.org/officeDocument/2006/relationships" xmlns:p="http://schemas.openxmlformats.org/presentationml/2006/main">
+  <p:cSld>
+    <p:spTree>
+      <p:nvGrpSpPr>
+        <p:cNvPr id="1" name=""/>
+        <p:cNvGrpSpPr/>
+        <p:nvPr/>
+      </p:nvGrpSpPr>
+      <p:grpSpPr>
+        <a:xfrm>
+          <a:off x="0" y="0"/>
+          <a:ext cx="0" cy="0"/>
+          <a:chOff x="0" y="0"/>
+          <a:chExt cx="0" cy="0"/>
+        </a:xfrm>
+      </p:grpSpPr>
+      <p:sp>
+        <p:nvSpPr>
+          <p:cNvPr id="2" name="Title 1"/>
+          <p:cNvSpPr>
+            <a:spLocks noGrp="1"/>
+          </p:cNvSpPr>
+          <p:nvPr>
+            <p:ph type="title"/>
+          </p:nvPr>
+        </p:nvSpPr>
+        <p:spPr/>
+        <p:txBody>
+          <a:bodyPr/>
+          <a:lstStyle/>
+          <a:p>
+            <a:r>
+              <a:rPr lang="en-US" dirty="0"/>
+              <a:t>Write Code!</a:t>
+            </a:r>
+          </a:p>
+        </p:txBody>
+      </p:sp>
+      <p:sp>
+        <p:nvSpPr>
+          <p:cNvPr id="3" name="Content Placeholder 2"/>
+          <p:cNvSpPr>
+            <a:spLocks noGrp="1"/>
+          </p:cNvSpPr>
+          <p:nvPr>
+            <p:ph idx="1"/>
+          </p:nvPr>
+        </p:nvSpPr>
+        <p:spPr/>
+        <p:txBody>
+          <a:bodyPr/>
+          <a:lstStyle/>
+          <a:p>
+            <a:r>
+              <a:rPr lang="en-US" dirty="0"/>
+              <a:t>You will have to look through all source files and implement all code sections / classes that are not complete.</a:t>
+            </a:r>
+          </a:p>
+          <a:p>
+            <a:r>
+              <a:rPr lang="en-US" dirty="0"/>
+              <a:t>When completed, you can launch the main program by opening “GameManager.java” and pressing SHIFT-F10.</a:t>
+            </a:r>
+          </a:p>
+          <a:p>
+            <a:r>
+              <a:rPr lang="en-US" dirty="0"/>
+              <a:t>Read all files, comments, and methods.</a:t>
+            </a:r>
+          </a:p>
+          <a:p>
+            <a:r>
+              <a:rPr lang="en-US" dirty="0"/>
+              <a:t>You’re in grad school now, your hand is not being held – figure out the structure, and write java code to create your battle ship game.</a:t>
+            </a:r>
+          </a:p>
+        </p:txBody>
+      </p:sp>
+    </p:spTree>
+    <p:extLst>
+      <p:ext uri="{BB962C8B-B14F-4D97-AF65-F5344CB8AC3E}">
+        <p14:creationId xmlns:p14="http://schemas.microsoft.com/office/powerpoint/2010/main" val="3894530024"/>
+      </p:ext>
+    </p:extLst>
+  </p:cSld>
+  <p:clrMapOvr>
+    <a:masterClrMapping/>
+  </p:clrMapOvr>
+</p:sld>
+</file>
+
+<file path=ppt/slides/slide3.xml><?xml version="1.0" encoding="utf-8"?>
+<p:sld xmlns:a="http://schemas.openxmlformats.org/drawingml/2006/main" xmlns:r="http://schemas.openxmlformats.org/officeDocument/2006/relationships" xmlns:p="http://schemas.openxmlformats.org/presentationml/2006/main">
+  <p:cSld>
+    <p:spTree>
+      <p:nvGrpSpPr>
+        <p:cNvPr id="1" name=""/>
+        <p:cNvGrpSpPr/>
+        <p:nvPr/>
+      </p:nvGrpSpPr>
+      <p:grpSpPr>
+        <a:xfrm>
+          <a:off x="0" y="0"/>
+          <a:ext cx="0" cy="0"/>
+          <a:chOff x="0" y="0"/>
+          <a:chExt cx="0" cy="0"/>
+        </a:xfrm>
+      </p:grpSpPr>
+      <p:sp>
+        <p:nvSpPr>
+          <p:cNvPr id="2" name="Title 1"/>
+          <p:cNvSpPr>
+            <a:spLocks noGrp="1"/>
+          </p:cNvSpPr>
+          <p:nvPr>
+            <p:ph type="title"/>
+          </p:nvPr>
+        </p:nvSpPr>
+        <p:spPr/>
+        <p:txBody>
+          <a:bodyPr/>
+          <a:lstStyle/>
+          <a:p>
+            <a:r>
+              <a:rPr lang="en-US" dirty="0"/>
+              <a:t>How to Play Battleship</a:t>
+            </a:r>
+          </a:p>
+        </p:txBody>
+      </p:sp>
+      <p:sp>
+        <p:nvSpPr>
+          <p:cNvPr id="3" name="Content Placeholder 2"/>
+          <p:cNvSpPr>
+            <a:spLocks noGrp="1"/>
+          </p:cNvSpPr>
+          <p:nvPr>
+            <p:ph idx="1"/>
+          </p:nvPr>
+        </p:nvSpPr>
+        <p:spPr/>
+        <p:txBody>
+          <a:bodyPr>
+            <a:normAutofit lnSpcReduction="10000"/>
+          </a:bodyPr>
+          <a:lstStyle/>
+          <a:p>
+            <a:r>
+              <a:rPr lang="en-US" dirty="0"/>
+              <a:t>When you run </a:t>
+            </a:r>
+            <a:r>
+              <a:rPr lang="en-US" dirty="0" err="1"/>
+              <a:t>GameManager</a:t>
+            </a:r>
+            <a:r>
+              <a:rPr lang="en-US" dirty="0"/>
+              <a:t>, a server instance will start on your local machine. Alternatively, you can simply launch my implementation as java .jar file from a console window by double clicking “Launch </a:t>
+            </a:r>
+            <a:r>
+              <a:rPr lang="en-US" dirty="0" err="1"/>
+              <a:t>Dr</a:t>
+            </a:r>
+            <a:r>
+              <a:rPr lang="en-US" dirty="0"/>
+              <a:t> </a:t>
+            </a:r>
+            <a:r>
+              <a:rPr lang="en-US" dirty="0" err="1"/>
+              <a:t>Nykls</a:t>
+            </a:r>
+            <a:r>
+              <a:rPr lang="en-US" dirty="0"/>
+              <a:t> Version.bat”</a:t>
+            </a:r>
+          </a:p>
+          <a:p>
+            <a:pPr lvl="1"/>
+            <a:r>
+              <a:rPr lang="en-US" dirty="0"/>
+              <a:t>This lets you test the behavior of a fully working implementation of Battleship to see how your implementation should behave.</a:t>
+            </a:r>
+          </a:p>
+          <a:p>
+            <a:r>
+              <a:rPr lang="en-US" dirty="0"/>
+              <a:t>Two Clients will joint in using </a:t>
+            </a:r>
+            <a:r>
+              <a:rPr lang="en-US" dirty="0" err="1"/>
+              <a:t>PuTTy</a:t>
+            </a:r>
+            <a:endParaRPr lang="en-US" dirty="0"/>
+          </a:p>
+          <a:p>
+            <a:r>
+              <a:rPr lang="en-US" dirty="0"/>
+              <a:t>See “SampleInput.txt” for an example set of valid input commands two players may enter as they battle each other.</a:t>
+            </a:r>
+          </a:p>
+          <a:p>
+            <a:r>
+              <a:rPr lang="en-US" dirty="0"/>
+              <a:t>Run the server and play a few games to understand what’s happening before trying to write code.</a:t>
+            </a:r>
+          </a:p>
+        </p:txBody>
+      </p:sp>
+    </p:spTree>
+    <p:extLst>
+      <p:ext uri="{BB962C8B-B14F-4D97-AF65-F5344CB8AC3E}">
+        <p14:creationId xmlns:p14="http://schemas.microsoft.com/office/powerpoint/2010/main" val="3279062054"/>
+      </p:ext>
+    </p:extLst>
+  </p:cSld>
+  <p:clrMapOvr>
+    <a:masterClrMapping/>
+  </p:clrMapOvr>
+</p:sld>
+</file>
+
+<file path=ppt/slides/slide4.xml><?xml version="1.0" encoding="utf-8"?>
+<p:sld xmlns:a="http://schemas.openxmlformats.org/drawingml/2006/main" xmlns:r="http://schemas.openxmlformats.org/officeDocument/2006/relationships" xmlns:p="http://schemas.openxmlformats.org/presentationml/2006/main">
+  <p:cSld>
+    <p:spTree>
+      <p:nvGrpSpPr>
+        <p:cNvPr id="1" name=""/>
+        <p:cNvGrpSpPr/>
+        <p:nvPr/>
+      </p:nvGrpSpPr>
+      <p:grpSpPr>
+        <a:xfrm>
+          <a:off x="0" y="0"/>
+          <a:ext cx="0" cy="0"/>
+          <a:chOff x="0" y="0"/>
+          <a:chExt cx="0" cy="0"/>
+        </a:xfrm>
+      </p:grpSpPr>
+      <p:sp>
+        <p:nvSpPr>
+          <p:cNvPr id="2" name="Title 1"/>
+          <p:cNvSpPr>
+            <a:spLocks noGrp="1"/>
+          </p:cNvSpPr>
+          <p:nvPr>
+            <p:ph type="title"/>
+          </p:nvPr>
+        </p:nvSpPr>
+        <p:spPr/>
+        <p:txBody>
+          <a:bodyPr/>
+          <a:lstStyle/>
+          <a:p>
+            <a:r>
+              <a:rPr lang="en-US" dirty="0"/>
+              <a:t>Run the Server</a:t>
+            </a:r>
+          </a:p>
+        </p:txBody>
+      </p:sp>
+      <p:pic>
+        <p:nvPicPr>
+          <p:cNvPr id="4" name="Content Placeholder 3"/>
+          <p:cNvPicPr>
+            <a:picLocks noGrp="1" noChangeAspect="1"/>
+          </p:cNvPicPr>
+          <p:nvPr>
+            <p:ph idx="1"/>
+          </p:nvPr>
+        </p:nvPicPr>
+        <p:blipFill>
+          <a:blip r:embed="rId2"/>
+          <a:stretch>
+            <a:fillRect/>
+          </a:stretch>
+        </p:blipFill>
+        <p:spPr>
+          <a:xfrm>
+            <a:off x="1576765" y="1825625"/>
+            <a:ext cx="9038470" cy="4351338"/>
+          </a:xfrm>
+          <a:prstGeom prst="rect">
+            <a:avLst/>
+          </a:prstGeom>
+        </p:spPr>
+      </p:pic>
+    </p:spTree>
+    <p:extLst>
+      <p:ext uri="{BB962C8B-B14F-4D97-AF65-F5344CB8AC3E}">
+        <p14:creationId xmlns:p14="http://schemas.microsoft.com/office/powerpoint/2010/main" val="4018649901"/>
+      </p:ext>
+    </p:extLst>
+  </p:cSld>
+  <p:clrMapOvr>
+    <a:masterClrMapping/>
+  </p:clrMapOvr>
+</p:sld>
+</file>
+
+<file path=ppt/slides/slide5.xml><?xml version="1.0" encoding="utf-8"?>
+<p:sld xmlns:a="http://schemas.openxmlformats.org/drawingml/2006/main" xmlns:r="http://schemas.openxmlformats.org/officeDocument/2006/relationships" xmlns:p="http://schemas.openxmlformats.org/presentationml/2006/main">
+  <p:cSld>
+    <p:spTree>
+      <p:nvGrpSpPr>
+        <p:cNvPr id="1" name=""/>
+        <p:cNvGrpSpPr/>
+        <p:nvPr/>
+      </p:nvGrpSpPr>
+      <p:grpSpPr>
+        <a:xfrm>
+          <a:off x="0" y="0"/>
+          <a:ext cx="0" cy="0"/>
+          <a:chOff x="0" y="0"/>
+          <a:chExt cx="0" cy="0"/>
+        </a:xfrm>
+      </p:grpSpPr>
+      <p:sp>
+        <p:nvSpPr>
+          <p:cNvPr id="2" name="Title 1"/>
+          <p:cNvSpPr>
+            <a:spLocks noGrp="1"/>
+          </p:cNvSpPr>
+          <p:nvPr>
+            <p:ph type="title"/>
+          </p:nvPr>
+        </p:nvSpPr>
+        <p:spPr/>
+        <p:txBody>
+          <a:bodyPr/>
+          <a:lstStyle/>
+          <a:p>
+            <a:r>
+              <a:rPr lang="en-US" dirty="0"/>
               <a:t>Connect Client 1</a:t>
             </a:r>
-            <a:endParaRPr lang="en-US" dirty="0"/>
           </a:p>
         </p:txBody>
       </p:sp>
@@ -3149,7 +3588,7 @@
 </p:sld>
 </file>
 
-<file path=ppt/slides/slide11.xml><?xml version="1.0" encoding="utf-8"?>
+<file path=ppt/slides/slide6.xml><?xml version="1.0" encoding="utf-8"?>
 <p:sld xmlns:a="http://schemas.openxmlformats.org/drawingml/2006/main" xmlns:r="http://schemas.openxmlformats.org/officeDocument/2006/relationships" xmlns:p="http://schemas.openxmlformats.org/presentationml/2006/main">
   <p:cSld>
     <p:spTree>
@@ -3182,18 +3621,17 @@
           <a:lstStyle/>
           <a:p>
             <a:r>
-              <a:rPr lang="en-US" dirty="0" smtClean="0"/>
+              <a:rPr lang="en-US" dirty="0"/>
               <a:t>Connect Client 2 (Run another instance of </a:t>
             </a:r>
             <a:r>
-              <a:rPr lang="en-US" dirty="0" err="1" smtClean="0"/>
+              <a:rPr lang="en-US" dirty="0" err="1"/>
               <a:t>PuTTY</a:t>
             </a:r>
             <a:r>
-              <a:rPr lang="en-US" dirty="0" smtClean="0"/>
+              <a:rPr lang="en-US" dirty="0"/>
               <a:t> and Connect to server a second time</a:t>
             </a:r>
-            <a:endParaRPr lang="en-US" dirty="0"/>
           </a:p>
         </p:txBody>
       </p:sp>
@@ -3236,1314 +3674,6 @@
 </p:sld>
 </file>
 
-<file path=ppt/slides/slide12.xml><?xml version="1.0" encoding="utf-8"?>
-<p:sld xmlns:a="http://schemas.openxmlformats.org/drawingml/2006/main" xmlns:r="http://schemas.openxmlformats.org/officeDocument/2006/relationships" xmlns:p="http://schemas.openxmlformats.org/presentationml/2006/main">
-  <p:cSld>
-    <p:spTree>
-      <p:nvGrpSpPr>
-        <p:cNvPr id="1" name=""/>
-        <p:cNvGrpSpPr/>
-        <p:nvPr/>
-      </p:nvGrpSpPr>
-      <p:grpSpPr>
-        <a:xfrm>
-          <a:off x="0" y="0"/>
-          <a:ext cx="0" cy="0"/>
-          <a:chOff x="0" y="0"/>
-          <a:chExt cx="0" cy="0"/>
-        </a:xfrm>
-      </p:grpSpPr>
-      <p:sp>
-        <p:nvSpPr>
-          <p:cNvPr id="2" name="Title 1"/>
-          <p:cNvSpPr>
-            <a:spLocks noGrp="1"/>
-          </p:cNvSpPr>
-          <p:nvPr>
-            <p:ph type="title"/>
-          </p:nvPr>
-        </p:nvSpPr>
-        <p:spPr/>
-        <p:txBody>
-          <a:bodyPr/>
-          <a:lstStyle/>
-          <a:p>
-            <a:r>
-              <a:rPr lang="en-US" dirty="0" smtClean="0"/>
-              <a:t>Sample Input from Each </a:t>
-            </a:r>
-            <a:r>
-              <a:rPr lang="en-US" dirty="0" smtClean="0"/>
-              <a:t>Player (SampleInput.txt)</a:t>
-            </a:r>
-            <a:endParaRPr lang="en-US" dirty="0"/>
-          </a:p>
-        </p:txBody>
-      </p:sp>
-      <p:sp>
-        <p:nvSpPr>
-          <p:cNvPr id="3" name="Content Placeholder 2"/>
-          <p:cNvSpPr>
-            <a:spLocks noGrp="1"/>
-          </p:cNvSpPr>
-          <p:nvPr>
-            <p:ph idx="1"/>
-          </p:nvPr>
-        </p:nvSpPr>
-        <p:spPr>
-          <a:xfrm>
-            <a:off x="838200" y="1825625"/>
-            <a:ext cx="3653367" cy="4351338"/>
-          </a:xfrm>
-        </p:spPr>
-        <p:txBody>
-          <a:bodyPr>
-            <a:normAutofit/>
-          </a:bodyPr>
-          <a:lstStyle/>
-          <a:p>
-            <a:r>
-              <a:rPr lang="en-US" dirty="0" smtClean="0"/>
-              <a:t>Player A</a:t>
-            </a:r>
-          </a:p>
-          <a:p>
-            <a:pPr lvl="1"/>
-            <a:r>
-              <a:rPr lang="en-US" dirty="0" smtClean="0"/>
-              <a:t>D 2 4 S </a:t>
-            </a:r>
-            <a:r>
-              <a:rPr lang="en-US" dirty="0" err="1" smtClean="0"/>
-              <a:t>DestroyA</a:t>
-            </a:r>
-            <a:endParaRPr lang="en-US" dirty="0" smtClean="0"/>
-          </a:p>
-          <a:p>
-            <a:pPr lvl="1"/>
-            <a:r>
-              <a:rPr lang="en-US" dirty="0" smtClean="0"/>
-              <a:t>C 3 5 N </a:t>
-            </a:r>
-            <a:r>
-              <a:rPr lang="en-US" dirty="0" err="1" smtClean="0"/>
-              <a:t>CruiserA</a:t>
-            </a:r>
-            <a:endParaRPr lang="en-US" dirty="0" smtClean="0"/>
-          </a:p>
-          <a:p>
-            <a:pPr lvl="1"/>
-            <a:r>
-              <a:rPr lang="en-US" dirty="0" smtClean="0"/>
-              <a:t>F 0 0</a:t>
-            </a:r>
-          </a:p>
-          <a:p>
-            <a:pPr lvl="1"/>
-            <a:r>
-              <a:rPr lang="en-US" dirty="0" smtClean="0"/>
-              <a:t>F 1 0</a:t>
-            </a:r>
-          </a:p>
-          <a:p>
-            <a:pPr lvl="1"/>
-            <a:r>
-              <a:rPr lang="en-US" dirty="0" smtClean="0"/>
-              <a:t>F 2 0</a:t>
-            </a:r>
-          </a:p>
-          <a:p>
-            <a:pPr lvl="1"/>
-            <a:r>
-              <a:rPr lang="en-US" dirty="0" smtClean="0"/>
-              <a:t>F 0 1</a:t>
-            </a:r>
-          </a:p>
-          <a:p>
-            <a:pPr lvl="1"/>
-            <a:r>
-              <a:rPr lang="en-US" dirty="0" smtClean="0"/>
-              <a:t>F 1 1</a:t>
-            </a:r>
-          </a:p>
-          <a:p>
-            <a:pPr lvl="1"/>
-            <a:r>
-              <a:rPr lang="en-US" dirty="0" smtClean="0"/>
-              <a:t>F 2 1</a:t>
-            </a:r>
-          </a:p>
-          <a:p>
-            <a:pPr lvl="1"/>
-            <a:r>
-              <a:rPr lang="en-US" dirty="0" smtClean="0"/>
-              <a:t>F 3 1</a:t>
-            </a:r>
-          </a:p>
-          <a:p>
-            <a:endParaRPr lang="en-US" dirty="0" smtClean="0"/>
-          </a:p>
-          <a:p>
-            <a:endParaRPr lang="en-US" dirty="0" smtClean="0"/>
-          </a:p>
-          <a:p>
-            <a:endParaRPr lang="en-US" dirty="0" smtClean="0"/>
-          </a:p>
-          <a:p>
-            <a:pPr marL="0" indent="0">
-              <a:buNone/>
-            </a:pPr>
-            <a:endParaRPr lang="en-US" dirty="0" smtClean="0"/>
-          </a:p>
-          <a:p>
-            <a:endParaRPr lang="en-US" dirty="0"/>
-          </a:p>
-        </p:txBody>
-      </p:sp>
-      <p:sp>
-        <p:nvSpPr>
-          <p:cNvPr id="4" name="Rectangle 3"/>
-          <p:cNvSpPr/>
-          <p:nvPr/>
-        </p:nvSpPr>
-        <p:spPr>
-          <a:xfrm>
-            <a:off x="6167292" y="1690688"/>
-            <a:ext cx="3403601" cy="4893647"/>
-          </a:xfrm>
-          <a:prstGeom prst="rect">
-            <a:avLst/>
-          </a:prstGeom>
-        </p:spPr>
-        <p:txBody>
-          <a:bodyPr wrap="square">
-            <a:spAutoFit/>
-          </a:bodyPr>
-          <a:lstStyle/>
-          <a:p>
-            <a:pPr marL="285750" indent="-285750">
-              <a:buFont typeface="Arial" panose="020B0604020202020204" pitchFamily="34" charset="0"/>
-              <a:buChar char="•"/>
-            </a:pPr>
-            <a:r>
-              <a:rPr lang="en-US" sz="2400" dirty="0" smtClean="0"/>
-              <a:t>Player B</a:t>
-            </a:r>
-          </a:p>
-          <a:p>
-            <a:pPr marL="742950" lvl="1" indent="-285750">
-              <a:buFont typeface="Arial" panose="020B0604020202020204" pitchFamily="34" charset="0"/>
-              <a:buChar char="•"/>
-            </a:pPr>
-            <a:r>
-              <a:rPr lang="en-US" sz="2400" dirty="0" smtClean="0"/>
-              <a:t>D 0 0 E </a:t>
-            </a:r>
-            <a:r>
-              <a:rPr lang="en-US" sz="2400" dirty="0" err="1" smtClean="0"/>
-              <a:t>DestroyB</a:t>
-            </a:r>
-            <a:endParaRPr lang="en-US" sz="2400" dirty="0" smtClean="0"/>
-          </a:p>
-          <a:p>
-            <a:pPr marL="742950" lvl="1" indent="-285750">
-              <a:buFont typeface="Arial" panose="020B0604020202020204" pitchFamily="34" charset="0"/>
-              <a:buChar char="•"/>
-            </a:pPr>
-            <a:r>
-              <a:rPr lang="en-US" sz="2400" dirty="0" smtClean="0"/>
-              <a:t>C 0 1 E </a:t>
-            </a:r>
-            <a:r>
-              <a:rPr lang="en-US" sz="2400" dirty="0" err="1" smtClean="0"/>
-              <a:t>CruiserB</a:t>
-            </a:r>
-            <a:endParaRPr lang="en-US" sz="2400" dirty="0" smtClean="0"/>
-          </a:p>
-          <a:p>
-            <a:pPr marL="742950" lvl="1" indent="-285750">
-              <a:buFont typeface="Arial" panose="020B0604020202020204" pitchFamily="34" charset="0"/>
-              <a:buChar char="•"/>
-            </a:pPr>
-            <a:r>
-              <a:rPr lang="en-US" sz="2400" dirty="0" smtClean="0"/>
-              <a:t>F 9 9</a:t>
-            </a:r>
-          </a:p>
-          <a:p>
-            <a:pPr marL="742950" lvl="1" indent="-285750">
-              <a:buFont typeface="Arial" panose="020B0604020202020204" pitchFamily="34" charset="0"/>
-              <a:buChar char="•"/>
-            </a:pPr>
-            <a:r>
-              <a:rPr lang="en-US" sz="2400" dirty="0" smtClean="0"/>
-              <a:t>F 10 10</a:t>
-            </a:r>
-          </a:p>
-          <a:p>
-            <a:pPr marL="742950" lvl="1" indent="-285750">
-              <a:buFont typeface="Arial" panose="020B0604020202020204" pitchFamily="34" charset="0"/>
-              <a:buChar char="•"/>
-            </a:pPr>
-            <a:r>
-              <a:rPr lang="en-US" sz="2400" dirty="0" smtClean="0"/>
-              <a:t>F 9 8</a:t>
-            </a:r>
-          </a:p>
-          <a:p>
-            <a:pPr marL="742950" lvl="1" indent="-285750">
-              <a:buFont typeface="Arial" panose="020B0604020202020204" pitchFamily="34" charset="0"/>
-              <a:buChar char="•"/>
-            </a:pPr>
-            <a:r>
-              <a:rPr lang="en-US" sz="2400" dirty="0" smtClean="0"/>
-              <a:t>F 2 4</a:t>
-            </a:r>
-          </a:p>
-          <a:p>
-            <a:pPr marL="742950" lvl="1" indent="-285750">
-              <a:buFont typeface="Arial" panose="020B0604020202020204" pitchFamily="34" charset="0"/>
-              <a:buChar char="•"/>
-            </a:pPr>
-            <a:r>
-              <a:rPr lang="en-US" sz="2400" dirty="0" smtClean="0"/>
-              <a:t>F 2 5</a:t>
-            </a:r>
-          </a:p>
-          <a:p>
-            <a:pPr marL="742950" lvl="1" indent="-285750">
-              <a:buFont typeface="Arial" panose="020B0604020202020204" pitchFamily="34" charset="0"/>
-              <a:buChar char="•"/>
-            </a:pPr>
-            <a:r>
-              <a:rPr lang="en-US" sz="2400" dirty="0" smtClean="0"/>
-              <a:t>F 2 6</a:t>
-            </a:r>
-          </a:p>
-          <a:p>
-            <a:pPr marL="742950" lvl="1" indent="-285750">
-              <a:buFont typeface="Arial" panose="020B0604020202020204" pitchFamily="34" charset="0"/>
-              <a:buChar char="•"/>
-            </a:pPr>
-            <a:r>
-              <a:rPr lang="en-US" sz="2400" dirty="0" smtClean="0"/>
-              <a:t>F 3 5</a:t>
-            </a:r>
-          </a:p>
-          <a:p>
-            <a:pPr marL="742950" lvl="1" indent="-285750">
-              <a:buFont typeface="Arial" panose="020B0604020202020204" pitchFamily="34" charset="0"/>
-              <a:buChar char="•"/>
-            </a:pPr>
-            <a:r>
-              <a:rPr lang="en-US" sz="2400" dirty="0" smtClean="0"/>
-              <a:t>F 3 2</a:t>
-            </a:r>
-          </a:p>
-          <a:p>
-            <a:pPr marL="742950" lvl="1" indent="-285750">
-              <a:buFont typeface="Arial" panose="020B0604020202020204" pitchFamily="34" charset="0"/>
-              <a:buChar char="•"/>
-            </a:pPr>
-            <a:r>
-              <a:rPr lang="en-US" sz="2400" dirty="0" smtClean="0"/>
-              <a:t>F 3 3</a:t>
-            </a:r>
-          </a:p>
-          <a:p>
-            <a:pPr marL="742950" lvl="1" indent="-285750">
-              <a:buFont typeface="Arial" panose="020B0604020202020204" pitchFamily="34" charset="0"/>
-              <a:buChar char="•"/>
-            </a:pPr>
-            <a:r>
-              <a:rPr lang="en-US" sz="2400" dirty="0" smtClean="0"/>
-              <a:t>F 3 4</a:t>
-            </a:r>
-          </a:p>
-        </p:txBody>
-      </p:sp>
-    </p:spTree>
-    <p:extLst>
-      <p:ext uri="{BB962C8B-B14F-4D97-AF65-F5344CB8AC3E}">
-        <p14:creationId xmlns:p14="http://schemas.microsoft.com/office/powerpoint/2010/main" val="1940393625"/>
-      </p:ext>
-    </p:extLst>
-  </p:cSld>
-  <p:clrMapOvr>
-    <a:masterClrMapping/>
-  </p:clrMapOvr>
-</p:sld>
-</file>
-
-<file path=ppt/slides/slide13.xml><?xml version="1.0" encoding="utf-8"?>
-<p:sld xmlns:a="http://schemas.openxmlformats.org/drawingml/2006/main" xmlns:r="http://schemas.openxmlformats.org/officeDocument/2006/relationships" xmlns:p="http://schemas.openxmlformats.org/presentationml/2006/main">
-  <p:cSld>
-    <p:spTree>
-      <p:nvGrpSpPr>
-        <p:cNvPr id="1" name=""/>
-        <p:cNvGrpSpPr/>
-        <p:nvPr/>
-      </p:nvGrpSpPr>
-      <p:grpSpPr>
-        <a:xfrm>
-          <a:off x="0" y="0"/>
-          <a:ext cx="0" cy="0"/>
-          <a:chOff x="0" y="0"/>
-          <a:chExt cx="0" cy="0"/>
-        </a:xfrm>
-      </p:grpSpPr>
-      <p:sp>
-        <p:nvSpPr>
-          <p:cNvPr id="2" name="Title 1"/>
-          <p:cNvSpPr>
-            <a:spLocks noGrp="1"/>
-          </p:cNvSpPr>
-          <p:nvPr>
-            <p:ph type="title"/>
-          </p:nvPr>
-        </p:nvSpPr>
-        <p:spPr/>
-        <p:txBody>
-          <a:bodyPr/>
-          <a:lstStyle/>
-          <a:p>
-            <a:r>
-              <a:rPr lang="en-US" dirty="0" smtClean="0"/>
-              <a:t>Player 1 vs</a:t>
-            </a:r>
-            <a:br>
-              <a:rPr lang="en-US" dirty="0" smtClean="0"/>
-            </a:br>
-            <a:r>
-              <a:rPr lang="en-US" dirty="0" smtClean="0"/>
-              <a:t> Player 2</a:t>
-            </a:r>
-            <a:endParaRPr lang="en-US" dirty="0"/>
-          </a:p>
-        </p:txBody>
-      </p:sp>
-      <p:pic>
-        <p:nvPicPr>
-          <p:cNvPr id="4" name="Content Placeholder 3"/>
-          <p:cNvPicPr>
-            <a:picLocks noGrp="1" noChangeAspect="1"/>
-          </p:cNvPicPr>
-          <p:nvPr>
-            <p:ph idx="1"/>
-          </p:nvPr>
-        </p:nvPicPr>
-        <p:blipFill>
-          <a:blip r:embed="rId2"/>
-          <a:stretch>
-            <a:fillRect/>
-          </a:stretch>
-        </p:blipFill>
-        <p:spPr>
-          <a:xfrm>
-            <a:off x="5065967" y="56092"/>
-            <a:ext cx="6648079" cy="6801908"/>
-          </a:xfrm>
-          <a:prstGeom prst="rect">
-            <a:avLst/>
-          </a:prstGeom>
-        </p:spPr>
-      </p:pic>
-      <p:sp>
-        <p:nvSpPr>
-          <p:cNvPr id="3" name="TextBox 2"/>
-          <p:cNvSpPr txBox="1"/>
-          <p:nvPr/>
-        </p:nvSpPr>
-        <p:spPr>
-          <a:xfrm>
-            <a:off x="572972" y="2138833"/>
-            <a:ext cx="4273740" cy="1477328"/>
-          </a:xfrm>
-          <a:prstGeom prst="rect">
-            <a:avLst/>
-          </a:prstGeom>
-          <a:noFill/>
-        </p:spPr>
-        <p:txBody>
-          <a:bodyPr wrap="square" rtlCol="0">
-            <a:spAutoFit/>
-          </a:bodyPr>
-          <a:lstStyle/>
-          <a:p>
-            <a:r>
-              <a:rPr lang="en-US" dirty="0" smtClean="0"/>
-              <a:t>Ensure you play against yourself several times before attempting to write source code. You will have to infer the software design and structure of the source code based on the behavior of the program.</a:t>
-            </a:r>
-            <a:endParaRPr lang="en-US" dirty="0"/>
-          </a:p>
-        </p:txBody>
-      </p:sp>
-    </p:spTree>
-    <p:extLst>
-      <p:ext uri="{BB962C8B-B14F-4D97-AF65-F5344CB8AC3E}">
-        <p14:creationId xmlns:p14="http://schemas.microsoft.com/office/powerpoint/2010/main" val="2902825201"/>
-      </p:ext>
-    </p:extLst>
-  </p:cSld>
-  <p:clrMapOvr>
-    <a:masterClrMapping/>
-  </p:clrMapOvr>
-</p:sld>
-</file>
-
-<file path=ppt/slides/slide14.xml><?xml version="1.0" encoding="utf-8"?>
-<p:sld xmlns:a="http://schemas.openxmlformats.org/drawingml/2006/main" xmlns:r="http://schemas.openxmlformats.org/officeDocument/2006/relationships" xmlns:p="http://schemas.openxmlformats.org/presentationml/2006/main">
-  <p:cSld>
-    <p:spTree>
-      <p:nvGrpSpPr>
-        <p:cNvPr id="1" name=""/>
-        <p:cNvGrpSpPr/>
-        <p:nvPr/>
-      </p:nvGrpSpPr>
-      <p:grpSpPr>
-        <a:xfrm>
-          <a:off x="0" y="0"/>
-          <a:ext cx="0" cy="0"/>
-          <a:chOff x="0" y="0"/>
-          <a:chExt cx="0" cy="0"/>
-        </a:xfrm>
-      </p:grpSpPr>
-      <p:sp>
-        <p:nvSpPr>
-          <p:cNvPr id="2" name="Title 1"/>
-          <p:cNvSpPr>
-            <a:spLocks noGrp="1"/>
-          </p:cNvSpPr>
-          <p:nvPr>
-            <p:ph type="title"/>
-          </p:nvPr>
-        </p:nvSpPr>
-        <p:spPr/>
-        <p:txBody>
-          <a:bodyPr/>
-          <a:lstStyle/>
-          <a:p>
-            <a:r>
-              <a:rPr lang="en-US" dirty="0" smtClean="0"/>
-              <a:t>Input can be typed one line at a type. Each Player can do this independently.</a:t>
-            </a:r>
-            <a:endParaRPr lang="en-US" dirty="0"/>
-          </a:p>
-        </p:txBody>
-      </p:sp>
-      <p:sp>
-        <p:nvSpPr>
-          <p:cNvPr id="3" name="Content Placeholder 2"/>
-          <p:cNvSpPr>
-            <a:spLocks noGrp="1"/>
-          </p:cNvSpPr>
-          <p:nvPr>
-            <p:ph idx="1"/>
-          </p:nvPr>
-        </p:nvSpPr>
-        <p:spPr/>
-        <p:txBody>
-          <a:bodyPr>
-            <a:normAutofit/>
-          </a:bodyPr>
-          <a:lstStyle/>
-          <a:p>
-            <a:r>
-              <a:rPr lang="en-US" dirty="0" smtClean="0"/>
-              <a:t>See PlayerA.log &amp; PlayerB.log</a:t>
-            </a:r>
-          </a:p>
-          <a:p>
-            <a:pPr lvl="1"/>
-            <a:r>
-              <a:rPr lang="en-US" dirty="0" smtClean="0"/>
-              <a:t>Shows the board setup and each command.</a:t>
-            </a:r>
-          </a:p>
-        </p:txBody>
-      </p:sp>
-    </p:spTree>
-    <p:extLst>
-      <p:ext uri="{BB962C8B-B14F-4D97-AF65-F5344CB8AC3E}">
-        <p14:creationId xmlns:p14="http://schemas.microsoft.com/office/powerpoint/2010/main" val="2224489887"/>
-      </p:ext>
-    </p:extLst>
-  </p:cSld>
-  <p:clrMapOvr>
-    <a:masterClrMapping/>
-  </p:clrMapOvr>
-</p:sld>
-</file>
-
-<file path=ppt/slides/slide15.xml><?xml version="1.0" encoding="utf-8"?>
-<p:sld xmlns:a="http://schemas.openxmlformats.org/drawingml/2006/main" xmlns:r="http://schemas.openxmlformats.org/officeDocument/2006/relationships" xmlns:p="http://schemas.openxmlformats.org/presentationml/2006/main">
-  <p:cSld>
-    <p:spTree>
-      <p:nvGrpSpPr>
-        <p:cNvPr id="1" name=""/>
-        <p:cNvGrpSpPr/>
-        <p:nvPr/>
-      </p:nvGrpSpPr>
-      <p:grpSpPr>
-        <a:xfrm>
-          <a:off x="0" y="0"/>
-          <a:ext cx="0" cy="0"/>
-          <a:chOff x="0" y="0"/>
-          <a:chExt cx="0" cy="0"/>
-        </a:xfrm>
-      </p:grpSpPr>
-      <p:sp>
-        <p:nvSpPr>
-          <p:cNvPr id="2" name="Title 1"/>
-          <p:cNvSpPr>
-            <a:spLocks noGrp="1"/>
-          </p:cNvSpPr>
-          <p:nvPr>
-            <p:ph type="title"/>
-          </p:nvPr>
-        </p:nvSpPr>
-        <p:spPr/>
-        <p:txBody>
-          <a:bodyPr/>
-          <a:lstStyle/>
-          <a:p>
-            <a:r>
-              <a:rPr lang="en-US" dirty="0" smtClean="0"/>
-              <a:t>On Your Own</a:t>
-            </a:r>
-            <a:endParaRPr lang="en-US" dirty="0"/>
-          </a:p>
-        </p:txBody>
-      </p:sp>
-      <p:sp>
-        <p:nvSpPr>
-          <p:cNvPr id="3" name="Content Placeholder 2"/>
-          <p:cNvSpPr>
-            <a:spLocks noGrp="1"/>
-          </p:cNvSpPr>
-          <p:nvPr>
-            <p:ph idx="1"/>
-          </p:nvPr>
-        </p:nvSpPr>
-        <p:spPr/>
-        <p:txBody>
-          <a:bodyPr/>
-          <a:lstStyle/>
-          <a:p>
-            <a:r>
-              <a:rPr lang="en-US" dirty="0" smtClean="0"/>
-              <a:t>Complete the code skeleton to make your own Battleship server that lets two player interactively compete against one another simultaneously</a:t>
-            </a:r>
-            <a:r>
-              <a:rPr lang="en-US" dirty="0" smtClean="0"/>
-              <a:t>!</a:t>
-            </a:r>
-          </a:p>
-          <a:p>
-            <a:r>
-              <a:rPr lang="en-US" dirty="0" smtClean="0"/>
-              <a:t>Since it’s networked, you can play this across the internet!</a:t>
-            </a:r>
-            <a:endParaRPr lang="en-US" dirty="0"/>
-          </a:p>
-        </p:txBody>
-      </p:sp>
-    </p:spTree>
-    <p:extLst>
-      <p:ext uri="{BB962C8B-B14F-4D97-AF65-F5344CB8AC3E}">
-        <p14:creationId xmlns:p14="http://schemas.microsoft.com/office/powerpoint/2010/main" val="4070163623"/>
-      </p:ext>
-    </p:extLst>
-  </p:cSld>
-  <p:clrMapOvr>
-    <a:masterClrMapping/>
-  </p:clrMapOvr>
-</p:sld>
-</file>
-
-<file path=ppt/slides/slide16.xml><?xml version="1.0" encoding="utf-8"?>
-<p:sld xmlns:a="http://schemas.openxmlformats.org/drawingml/2006/main" xmlns:r="http://schemas.openxmlformats.org/officeDocument/2006/relationships" xmlns:p="http://schemas.openxmlformats.org/presentationml/2006/main">
-  <p:cSld>
-    <p:spTree>
-      <p:nvGrpSpPr>
-        <p:cNvPr id="1" name=""/>
-        <p:cNvGrpSpPr/>
-        <p:nvPr/>
-      </p:nvGrpSpPr>
-      <p:grpSpPr>
-        <a:xfrm>
-          <a:off x="0" y="0"/>
-          <a:ext cx="0" cy="0"/>
-          <a:chOff x="0" y="0"/>
-          <a:chExt cx="0" cy="0"/>
-        </a:xfrm>
-      </p:grpSpPr>
-      <p:sp>
-        <p:nvSpPr>
-          <p:cNvPr id="2" name="Title 1"/>
-          <p:cNvSpPr>
-            <a:spLocks noGrp="1"/>
-          </p:cNvSpPr>
-          <p:nvPr>
-            <p:ph type="title"/>
-          </p:nvPr>
-        </p:nvSpPr>
-        <p:spPr/>
-        <p:txBody>
-          <a:bodyPr/>
-          <a:lstStyle/>
-          <a:p>
-            <a:r>
-              <a:rPr lang="en-US" dirty="0" smtClean="0"/>
-              <a:t>Python</a:t>
-            </a:r>
-            <a:endParaRPr lang="en-US" dirty="0"/>
-          </a:p>
-        </p:txBody>
-      </p:sp>
-      <p:sp>
-        <p:nvSpPr>
-          <p:cNvPr id="3" name="Content Placeholder 2"/>
-          <p:cNvSpPr>
-            <a:spLocks noGrp="1"/>
-          </p:cNvSpPr>
-          <p:nvPr>
-            <p:ph idx="1"/>
-          </p:nvPr>
-        </p:nvSpPr>
-        <p:spPr/>
-        <p:txBody>
-          <a:bodyPr/>
-          <a:lstStyle/>
-          <a:p>
-            <a:r>
-              <a:rPr lang="en-US" dirty="0" smtClean="0"/>
-              <a:t>After Battleship, Go through the python slides, too!</a:t>
-            </a:r>
-          </a:p>
-          <a:p>
-            <a:r>
-              <a:rPr lang="en-US" dirty="0" smtClean="0"/>
-              <a:t>Use Python to write a regular expression tool that can refactor.py the input in </a:t>
-            </a:r>
-            <a:r>
-              <a:rPr lang="en-US" smtClean="0"/>
-              <a:t>/python/refactor/test</a:t>
-            </a:r>
-          </a:p>
-          <a:p>
-            <a:endParaRPr lang="en-US"/>
-          </a:p>
-        </p:txBody>
-      </p:sp>
-    </p:spTree>
-    <p:extLst>
-      <p:ext uri="{BB962C8B-B14F-4D97-AF65-F5344CB8AC3E}">
-        <p14:creationId xmlns:p14="http://schemas.microsoft.com/office/powerpoint/2010/main" val="1226953482"/>
-      </p:ext>
-    </p:extLst>
-  </p:cSld>
-  <p:clrMapOvr>
-    <a:masterClrMapping/>
-  </p:clrMapOvr>
-</p:sld>
-</file>
-
-<file path=ppt/slides/slide2.xml><?xml version="1.0" encoding="utf-8"?>
-<p:sld xmlns:a="http://schemas.openxmlformats.org/drawingml/2006/main" xmlns:r="http://schemas.openxmlformats.org/officeDocument/2006/relationships" xmlns:p="http://schemas.openxmlformats.org/presentationml/2006/main">
-  <p:cSld>
-    <p:spTree>
-      <p:nvGrpSpPr>
-        <p:cNvPr id="1" name=""/>
-        <p:cNvGrpSpPr/>
-        <p:nvPr/>
-      </p:nvGrpSpPr>
-      <p:grpSpPr>
-        <a:xfrm>
-          <a:off x="0" y="0"/>
-          <a:ext cx="0" cy="0"/>
-          <a:chOff x="0" y="0"/>
-          <a:chExt cx="0" cy="0"/>
-        </a:xfrm>
-      </p:grpSpPr>
-      <p:sp>
-        <p:nvSpPr>
-          <p:cNvPr id="2" name="Title 1"/>
-          <p:cNvSpPr>
-            <a:spLocks noGrp="1"/>
-          </p:cNvSpPr>
-          <p:nvPr>
-            <p:ph type="title"/>
-          </p:nvPr>
-        </p:nvSpPr>
-        <p:spPr/>
-        <p:txBody>
-          <a:bodyPr/>
-          <a:lstStyle/>
-          <a:p>
-            <a:r>
-              <a:rPr lang="en-US" dirty="0" smtClean="0"/>
-              <a:t>Download the Java JDK.</a:t>
-            </a:r>
-            <a:endParaRPr lang="en-US" dirty="0"/>
-          </a:p>
-        </p:txBody>
-      </p:sp>
-      <p:pic>
-        <p:nvPicPr>
-          <p:cNvPr id="5" name="Picture 4"/>
-          <p:cNvPicPr>
-            <a:picLocks noChangeAspect="1"/>
-          </p:cNvPicPr>
-          <p:nvPr/>
-        </p:nvPicPr>
-        <p:blipFill>
-          <a:blip r:embed="rId2"/>
-          <a:stretch>
-            <a:fillRect/>
-          </a:stretch>
-        </p:blipFill>
-        <p:spPr>
-          <a:xfrm>
-            <a:off x="223837" y="1348845"/>
-            <a:ext cx="8162925" cy="581025"/>
-          </a:xfrm>
-          <a:prstGeom prst="rect">
-            <a:avLst/>
-          </a:prstGeom>
-        </p:spPr>
-      </p:pic>
-      <p:pic>
-        <p:nvPicPr>
-          <p:cNvPr id="7" name="Picture 6"/>
-          <p:cNvPicPr>
-            <a:picLocks noChangeAspect="1"/>
-          </p:cNvPicPr>
-          <p:nvPr/>
-        </p:nvPicPr>
-        <p:blipFill>
-          <a:blip r:embed="rId3"/>
-          <a:stretch>
-            <a:fillRect/>
-          </a:stretch>
-        </p:blipFill>
-        <p:spPr>
-          <a:xfrm>
-            <a:off x="3476625" y="2027237"/>
-            <a:ext cx="7877175" cy="4714875"/>
-          </a:xfrm>
-          <a:prstGeom prst="rect">
-            <a:avLst/>
-          </a:prstGeom>
-        </p:spPr>
-      </p:pic>
-    </p:spTree>
-    <p:extLst>
-      <p:ext uri="{BB962C8B-B14F-4D97-AF65-F5344CB8AC3E}">
-        <p14:creationId xmlns:p14="http://schemas.microsoft.com/office/powerpoint/2010/main" val="3800482777"/>
-      </p:ext>
-    </p:extLst>
-  </p:cSld>
-  <p:clrMapOvr>
-    <a:masterClrMapping/>
-  </p:clrMapOvr>
-</p:sld>
-</file>
-
-<file path=ppt/slides/slide3.xml><?xml version="1.0" encoding="utf-8"?>
-<p:sld xmlns:a="http://schemas.openxmlformats.org/drawingml/2006/main" xmlns:r="http://schemas.openxmlformats.org/officeDocument/2006/relationships" xmlns:p="http://schemas.openxmlformats.org/presentationml/2006/main">
-  <p:cSld>
-    <p:spTree>
-      <p:nvGrpSpPr>
-        <p:cNvPr id="1" name=""/>
-        <p:cNvGrpSpPr/>
-        <p:nvPr/>
-      </p:nvGrpSpPr>
-      <p:grpSpPr>
-        <a:xfrm>
-          <a:off x="0" y="0"/>
-          <a:ext cx="0" cy="0"/>
-          <a:chOff x="0" y="0"/>
-          <a:chExt cx="0" cy="0"/>
-        </a:xfrm>
-      </p:grpSpPr>
-      <p:sp>
-        <p:nvSpPr>
-          <p:cNvPr id="2" name="Title 1"/>
-          <p:cNvSpPr>
-            <a:spLocks noGrp="1"/>
-          </p:cNvSpPr>
-          <p:nvPr>
-            <p:ph type="title"/>
-          </p:nvPr>
-        </p:nvSpPr>
-        <p:spPr/>
-        <p:txBody>
-          <a:bodyPr/>
-          <a:lstStyle/>
-          <a:p>
-            <a:r>
-              <a:rPr lang="en-US" dirty="0" smtClean="0"/>
-              <a:t>Add </a:t>
-            </a:r>
-            <a:r>
-              <a:rPr lang="en-US" dirty="0" err="1" smtClean="0"/>
-              <a:t>javac</a:t>
-            </a:r>
-            <a:r>
-              <a:rPr lang="en-US" dirty="0" smtClean="0"/>
-              <a:t> to path</a:t>
-            </a:r>
-            <a:endParaRPr lang="en-US" dirty="0"/>
-          </a:p>
-        </p:txBody>
-      </p:sp>
-      <p:sp>
-        <p:nvSpPr>
-          <p:cNvPr id="3" name="Content Placeholder 2"/>
-          <p:cNvSpPr>
-            <a:spLocks noGrp="1"/>
-          </p:cNvSpPr>
-          <p:nvPr>
-            <p:ph idx="1"/>
-          </p:nvPr>
-        </p:nvSpPr>
-        <p:spPr>
-          <a:xfrm>
-            <a:off x="5372100" y="1825625"/>
-            <a:ext cx="5981700" cy="4351338"/>
-          </a:xfrm>
-        </p:spPr>
-        <p:txBody>
-          <a:bodyPr/>
-          <a:lstStyle/>
-          <a:p>
-            <a:r>
-              <a:rPr lang="en-US" dirty="0" smtClean="0"/>
-              <a:t>The open CMD window and check path. Note: Your latest version may end with a different number (like _144).</a:t>
-            </a:r>
-          </a:p>
-          <a:p>
-            <a:endParaRPr lang="en-US" dirty="0"/>
-          </a:p>
-        </p:txBody>
-      </p:sp>
-      <p:pic>
-        <p:nvPicPr>
-          <p:cNvPr id="5" name="Picture 4"/>
-          <p:cNvPicPr>
-            <a:picLocks noChangeAspect="1"/>
-          </p:cNvPicPr>
-          <p:nvPr/>
-        </p:nvPicPr>
-        <p:blipFill>
-          <a:blip r:embed="rId2"/>
-          <a:stretch>
-            <a:fillRect/>
-          </a:stretch>
-        </p:blipFill>
-        <p:spPr>
-          <a:xfrm>
-            <a:off x="838200" y="1825625"/>
-            <a:ext cx="4030133" cy="4432074"/>
-          </a:xfrm>
-          <a:prstGeom prst="rect">
-            <a:avLst/>
-          </a:prstGeom>
-        </p:spPr>
-      </p:pic>
-      <p:pic>
-        <p:nvPicPr>
-          <p:cNvPr id="6" name="Picture 5"/>
-          <p:cNvPicPr>
-            <a:picLocks noChangeAspect="1"/>
-          </p:cNvPicPr>
-          <p:nvPr/>
-        </p:nvPicPr>
-        <p:blipFill>
-          <a:blip r:embed="rId3"/>
-          <a:stretch>
-            <a:fillRect/>
-          </a:stretch>
-        </p:blipFill>
-        <p:spPr>
-          <a:xfrm>
-            <a:off x="5441950" y="3705225"/>
-            <a:ext cx="5305425" cy="2266950"/>
-          </a:xfrm>
-          <a:prstGeom prst="rect">
-            <a:avLst/>
-          </a:prstGeom>
-        </p:spPr>
-      </p:pic>
-    </p:spTree>
-    <p:extLst>
-      <p:ext uri="{BB962C8B-B14F-4D97-AF65-F5344CB8AC3E}">
-        <p14:creationId xmlns:p14="http://schemas.microsoft.com/office/powerpoint/2010/main" val="2477511357"/>
-      </p:ext>
-    </p:extLst>
-  </p:cSld>
-  <p:clrMapOvr>
-    <a:masterClrMapping/>
-  </p:clrMapOvr>
-</p:sld>
-</file>
-
-<file path=ppt/slides/slide4.xml><?xml version="1.0" encoding="utf-8"?>
-<p:sld xmlns:a="http://schemas.openxmlformats.org/drawingml/2006/main" xmlns:r="http://schemas.openxmlformats.org/officeDocument/2006/relationships" xmlns:p="http://schemas.openxmlformats.org/presentationml/2006/main">
-  <p:cSld>
-    <p:spTree>
-      <p:nvGrpSpPr>
-        <p:cNvPr id="1" name=""/>
-        <p:cNvGrpSpPr/>
-        <p:nvPr/>
-      </p:nvGrpSpPr>
-      <p:grpSpPr>
-        <a:xfrm>
-          <a:off x="0" y="0"/>
-          <a:ext cx="0" cy="0"/>
-          <a:chOff x="0" y="0"/>
-          <a:chExt cx="0" cy="0"/>
-        </a:xfrm>
-      </p:grpSpPr>
-      <p:sp>
-        <p:nvSpPr>
-          <p:cNvPr id="2" name="Title 1"/>
-          <p:cNvSpPr>
-            <a:spLocks noGrp="1"/>
-          </p:cNvSpPr>
-          <p:nvPr>
-            <p:ph type="title"/>
-          </p:nvPr>
-        </p:nvSpPr>
-        <p:spPr/>
-        <p:txBody>
-          <a:bodyPr/>
-          <a:lstStyle/>
-          <a:p>
-            <a:r>
-              <a:rPr lang="en-US" dirty="0" smtClean="0"/>
-              <a:t>Install </a:t>
-            </a:r>
-            <a:r>
-              <a:rPr lang="en-US" dirty="0" err="1" smtClean="0"/>
-              <a:t>Intellij</a:t>
-            </a:r>
-            <a:r>
-              <a:rPr lang="en-US" dirty="0" smtClean="0"/>
-              <a:t> IDEA (IDE Environment for java)</a:t>
-            </a:r>
-            <a:endParaRPr lang="en-US" dirty="0"/>
-          </a:p>
-        </p:txBody>
-      </p:sp>
-      <p:sp>
-        <p:nvSpPr>
-          <p:cNvPr id="3" name="Content Placeholder 2"/>
-          <p:cNvSpPr>
-            <a:spLocks noGrp="1"/>
-          </p:cNvSpPr>
-          <p:nvPr>
-            <p:ph idx="1"/>
-          </p:nvPr>
-        </p:nvSpPr>
-        <p:spPr/>
-        <p:txBody>
-          <a:bodyPr/>
-          <a:lstStyle/>
-          <a:p>
-            <a:endParaRPr lang="en-US" dirty="0"/>
-          </a:p>
-        </p:txBody>
-      </p:sp>
-      <p:pic>
-        <p:nvPicPr>
-          <p:cNvPr id="5" name="Picture 4"/>
-          <p:cNvPicPr>
-            <a:picLocks noChangeAspect="1"/>
-          </p:cNvPicPr>
-          <p:nvPr/>
-        </p:nvPicPr>
-        <p:blipFill>
-          <a:blip r:embed="rId2"/>
-          <a:stretch>
-            <a:fillRect/>
-          </a:stretch>
-        </p:blipFill>
-        <p:spPr>
-          <a:xfrm>
-            <a:off x="838200" y="1401232"/>
-            <a:ext cx="4180652" cy="4703234"/>
-          </a:xfrm>
-          <a:prstGeom prst="rect">
-            <a:avLst/>
-          </a:prstGeom>
-        </p:spPr>
-      </p:pic>
-      <p:sp>
-        <p:nvSpPr>
-          <p:cNvPr id="6" name="Oval 5"/>
-          <p:cNvSpPr/>
-          <p:nvPr/>
-        </p:nvSpPr>
-        <p:spPr>
-          <a:xfrm>
-            <a:off x="3382433" y="3378200"/>
-            <a:ext cx="952500" cy="465667"/>
-          </a:xfrm>
-          <a:prstGeom prst="ellipse">
-            <a:avLst/>
-          </a:prstGeom>
-          <a:noFill/>
-          <a:ln>
-            <a:solidFill>
-              <a:srgbClr val="FF0000"/>
-            </a:solidFill>
-          </a:ln>
-        </p:spPr>
-        <p:style>
-          <a:lnRef idx="2">
-            <a:schemeClr val="accent1">
-              <a:shade val="50000"/>
-            </a:schemeClr>
-          </a:lnRef>
-          <a:fillRef idx="1">
-            <a:schemeClr val="accent1"/>
-          </a:fillRef>
-          <a:effectRef idx="0">
-            <a:schemeClr val="accent1"/>
-          </a:effectRef>
-          <a:fontRef idx="minor">
-            <a:schemeClr val="lt1"/>
-          </a:fontRef>
-        </p:style>
-        <p:txBody>
-          <a:bodyPr rtlCol="0" anchor="ctr"/>
-          <a:lstStyle/>
-          <a:p>
-            <a:pPr algn="ctr"/>
-            <a:endParaRPr lang="en-US"/>
-          </a:p>
-        </p:txBody>
-      </p:sp>
-    </p:spTree>
-    <p:extLst>
-      <p:ext uri="{BB962C8B-B14F-4D97-AF65-F5344CB8AC3E}">
-        <p14:creationId xmlns:p14="http://schemas.microsoft.com/office/powerpoint/2010/main" val="1472048102"/>
-      </p:ext>
-    </p:extLst>
-  </p:cSld>
-  <p:clrMapOvr>
-    <a:masterClrMapping/>
-  </p:clrMapOvr>
-</p:sld>
-</file>
-
-<file path=ppt/slides/slide5.xml><?xml version="1.0" encoding="utf-8"?>
-<p:sld xmlns:a="http://schemas.openxmlformats.org/drawingml/2006/main" xmlns:r="http://schemas.openxmlformats.org/officeDocument/2006/relationships" xmlns:p="http://schemas.openxmlformats.org/presentationml/2006/main">
-  <p:cSld>
-    <p:spTree>
-      <p:nvGrpSpPr>
-        <p:cNvPr id="1" name=""/>
-        <p:cNvGrpSpPr/>
-        <p:nvPr/>
-      </p:nvGrpSpPr>
-      <p:grpSpPr>
-        <a:xfrm>
-          <a:off x="0" y="0"/>
-          <a:ext cx="0" cy="0"/>
-          <a:chOff x="0" y="0"/>
-          <a:chExt cx="0" cy="0"/>
-        </a:xfrm>
-      </p:grpSpPr>
-      <p:sp>
-        <p:nvSpPr>
-          <p:cNvPr id="2" name="Title 1"/>
-          <p:cNvSpPr>
-            <a:spLocks noGrp="1"/>
-          </p:cNvSpPr>
-          <p:nvPr>
-            <p:ph type="title"/>
-          </p:nvPr>
-        </p:nvSpPr>
-        <p:spPr/>
-        <p:txBody>
-          <a:bodyPr/>
-          <a:lstStyle/>
-          <a:p>
-            <a:r>
-              <a:rPr lang="en-US" dirty="0" smtClean="0"/>
-              <a:t>Import Existing Source Code</a:t>
-            </a:r>
-            <a:endParaRPr lang="en-US" dirty="0"/>
-          </a:p>
-        </p:txBody>
-      </p:sp>
-      <p:pic>
-        <p:nvPicPr>
-          <p:cNvPr id="4" name="Content Placeholder 3"/>
-          <p:cNvPicPr>
-            <a:picLocks noGrp="1" noChangeAspect="1"/>
-          </p:cNvPicPr>
-          <p:nvPr>
-            <p:ph idx="1"/>
-          </p:nvPr>
-        </p:nvPicPr>
-        <p:blipFill>
-          <a:blip r:embed="rId2"/>
-          <a:stretch>
-            <a:fillRect/>
-          </a:stretch>
-        </p:blipFill>
-        <p:spPr>
-          <a:xfrm>
-            <a:off x="324421" y="1851025"/>
-            <a:ext cx="4033224" cy="4351338"/>
-          </a:xfrm>
-          <a:prstGeom prst="rect">
-            <a:avLst/>
-          </a:prstGeom>
-        </p:spPr>
-      </p:pic>
-      <p:pic>
-        <p:nvPicPr>
-          <p:cNvPr id="5" name="Picture 4"/>
-          <p:cNvPicPr>
-            <a:picLocks noChangeAspect="1"/>
-          </p:cNvPicPr>
-          <p:nvPr/>
-        </p:nvPicPr>
-        <p:blipFill>
-          <a:blip r:embed="rId3"/>
-          <a:stretch>
-            <a:fillRect/>
-          </a:stretch>
-        </p:blipFill>
-        <p:spPr>
-          <a:xfrm>
-            <a:off x="4527550" y="1851025"/>
-            <a:ext cx="7443100" cy="4086225"/>
-          </a:xfrm>
-          <a:prstGeom prst="rect">
-            <a:avLst/>
-          </a:prstGeom>
-        </p:spPr>
-      </p:pic>
-    </p:spTree>
-    <p:extLst>
-      <p:ext uri="{BB962C8B-B14F-4D97-AF65-F5344CB8AC3E}">
-        <p14:creationId xmlns:p14="http://schemas.microsoft.com/office/powerpoint/2010/main" val="2229087458"/>
-      </p:ext>
-    </p:extLst>
-  </p:cSld>
-  <p:clrMapOvr>
-    <a:masterClrMapping/>
-  </p:clrMapOvr>
-</p:sld>
-</file>
-
-<file path=ppt/slides/slide6.xml><?xml version="1.0" encoding="utf-8"?>
-<p:sld xmlns:a="http://schemas.openxmlformats.org/drawingml/2006/main" xmlns:r="http://schemas.openxmlformats.org/officeDocument/2006/relationships" xmlns:p="http://schemas.openxmlformats.org/presentationml/2006/main">
-  <p:cSld>
-    <p:spTree>
-      <p:nvGrpSpPr>
-        <p:cNvPr id="1" name=""/>
-        <p:cNvGrpSpPr/>
-        <p:nvPr/>
-      </p:nvGrpSpPr>
-      <p:grpSpPr>
-        <a:xfrm>
-          <a:off x="0" y="0"/>
-          <a:ext cx="0" cy="0"/>
-          <a:chOff x="0" y="0"/>
-          <a:chExt cx="0" cy="0"/>
-        </a:xfrm>
-      </p:grpSpPr>
-      <p:sp>
-        <p:nvSpPr>
-          <p:cNvPr id="2" name="Title 1"/>
-          <p:cNvSpPr>
-            <a:spLocks noGrp="1"/>
-          </p:cNvSpPr>
-          <p:nvPr>
-            <p:ph type="title"/>
-          </p:nvPr>
-        </p:nvSpPr>
-        <p:spPr/>
-        <p:txBody>
-          <a:bodyPr/>
-          <a:lstStyle/>
-          <a:p>
-            <a:r>
-              <a:rPr lang="en-US" dirty="0" smtClean="0"/>
-              <a:t>Click “Next” 7 times until project is imported</a:t>
-            </a:r>
-            <a:endParaRPr lang="en-US" dirty="0"/>
-          </a:p>
-        </p:txBody>
-      </p:sp>
-      <p:sp>
-        <p:nvSpPr>
-          <p:cNvPr id="3" name="Content Placeholder 2"/>
-          <p:cNvSpPr>
-            <a:spLocks noGrp="1"/>
-          </p:cNvSpPr>
-          <p:nvPr>
-            <p:ph idx="1"/>
-          </p:nvPr>
-        </p:nvSpPr>
-        <p:spPr/>
-        <p:txBody>
-          <a:bodyPr/>
-          <a:lstStyle/>
-          <a:p>
-            <a:r>
-              <a:rPr lang="en-US" dirty="0" smtClean="0"/>
-              <a:t>If asked, set your JDK to Java JDK 1.8 – This should be discovered automatically after properly installing the JDK and adding it to your path.</a:t>
-            </a:r>
-          </a:p>
-          <a:p>
-            <a:endParaRPr lang="en-US" dirty="0"/>
-          </a:p>
-        </p:txBody>
-      </p:sp>
-      <p:pic>
-        <p:nvPicPr>
-          <p:cNvPr id="4" name="Picture 3"/>
-          <p:cNvPicPr>
-            <a:picLocks noChangeAspect="1"/>
-          </p:cNvPicPr>
-          <p:nvPr/>
-        </p:nvPicPr>
-        <p:blipFill>
-          <a:blip r:embed="rId2"/>
-          <a:stretch>
-            <a:fillRect/>
-          </a:stretch>
-        </p:blipFill>
-        <p:spPr>
-          <a:xfrm>
-            <a:off x="984250" y="3098800"/>
-            <a:ext cx="3790087" cy="3435350"/>
-          </a:xfrm>
-          <a:prstGeom prst="rect">
-            <a:avLst/>
-          </a:prstGeom>
-        </p:spPr>
-      </p:pic>
-    </p:spTree>
-    <p:extLst>
-      <p:ext uri="{BB962C8B-B14F-4D97-AF65-F5344CB8AC3E}">
-        <p14:creationId xmlns:p14="http://schemas.microsoft.com/office/powerpoint/2010/main" val="3533509060"/>
-      </p:ext>
-    </p:extLst>
-  </p:cSld>
-  <p:clrMapOvr>
-    <a:masterClrMapping/>
-  </p:clrMapOvr>
-</p:sld>
-</file>
-
 <file path=ppt/slides/slide7.xml><?xml version="1.0" encoding="utf-8"?>
 <p:sld xmlns:a="http://schemas.openxmlformats.org/drawingml/2006/main" xmlns:r="http://schemas.openxmlformats.org/officeDocument/2006/relationships" xmlns:p="http://schemas.openxmlformats.org/presentationml/2006/main">
   <p:cSld>
@@ -4577,58 +3707,298 @@
           <a:lstStyle/>
           <a:p>
             <a:r>
-              <a:rPr lang="en-US" dirty="0" smtClean="0"/>
-              <a:t>Write Code!</a:t>
+              <a:rPr lang="en-US" dirty="0"/>
+              <a:t>Sample Input from Each Player (SampleInput.txt)</a:t>
+            </a:r>
+          </a:p>
+        </p:txBody>
+      </p:sp>
+      <p:sp>
+        <p:nvSpPr>
+          <p:cNvPr id="3" name="Content Placeholder 2"/>
+          <p:cNvSpPr>
+            <a:spLocks noGrp="1"/>
+          </p:cNvSpPr>
+          <p:nvPr>
+            <p:ph idx="1"/>
+          </p:nvPr>
+        </p:nvSpPr>
+        <p:spPr>
+          <a:xfrm>
+            <a:off x="838200" y="1825625"/>
+            <a:ext cx="3653367" cy="4351338"/>
+          </a:xfrm>
+        </p:spPr>
+        <p:txBody>
+          <a:bodyPr>
+            <a:normAutofit/>
+          </a:bodyPr>
+          <a:lstStyle/>
+          <a:p>
+            <a:r>
+              <a:rPr lang="en-US" dirty="0"/>
+              <a:t>Player A</a:t>
+            </a:r>
+          </a:p>
+          <a:p>
+            <a:pPr lvl="1"/>
+            <a:r>
+              <a:rPr lang="en-US" dirty="0"/>
+              <a:t>D 2 4 S </a:t>
+            </a:r>
+            <a:r>
+              <a:rPr lang="en-US" dirty="0" err="1"/>
+              <a:t>DestroyA</a:t>
             </a:r>
             <a:endParaRPr lang="en-US" dirty="0"/>
           </a:p>
-        </p:txBody>
-      </p:sp>
-      <p:sp>
-        <p:nvSpPr>
-          <p:cNvPr id="3" name="Content Placeholder 2"/>
-          <p:cNvSpPr>
-            <a:spLocks noGrp="1"/>
-          </p:cNvSpPr>
-          <p:nvPr>
-            <p:ph idx="1"/>
-          </p:nvPr>
-        </p:nvSpPr>
-        <p:spPr/>
-        <p:txBody>
-          <a:bodyPr/>
-          <a:lstStyle/>
-          <a:p>
-            <a:r>
-              <a:rPr lang="en-US" dirty="0" smtClean="0"/>
-              <a:t>You will have to look through all source files and implement all code sections / classes that are not complete.</a:t>
-            </a:r>
-          </a:p>
-          <a:p>
-            <a:r>
-              <a:rPr lang="en-US" dirty="0" smtClean="0"/>
-              <a:t>When completed, you can launch the main program by opening “GameManager.java” and pressing SHIFT-F10.</a:t>
-            </a:r>
-          </a:p>
-          <a:p>
-            <a:r>
-              <a:rPr lang="en-US" dirty="0" smtClean="0"/>
-              <a:t>Read all files, comments, and methods.</a:t>
-            </a:r>
-          </a:p>
-          <a:p>
-            <a:r>
-              <a:rPr lang="en-US" dirty="0" smtClean="0"/>
-              <a:t>You’re in grad school now, your hand is not being held – figure out the structure, and write java code to create your battle ship game.</a:t>
+          <a:p>
+            <a:pPr lvl="1"/>
+            <a:r>
+              <a:rPr lang="en-US" dirty="0"/>
+              <a:t>C 3 5 N </a:t>
+            </a:r>
+            <a:r>
+              <a:rPr lang="en-US" dirty="0" err="1"/>
+              <a:t>CruiserA</a:t>
             </a:r>
             <a:endParaRPr lang="en-US" dirty="0"/>
+          </a:p>
+          <a:p>
+            <a:pPr lvl="1"/>
+            <a:r>
+              <a:rPr lang="en-US" dirty="0"/>
+              <a:t>F 0 0</a:t>
+            </a:r>
+          </a:p>
+          <a:p>
+            <a:pPr lvl="1"/>
+            <a:r>
+              <a:rPr lang="en-US" dirty="0"/>
+              <a:t>F 1 0</a:t>
+            </a:r>
+          </a:p>
+          <a:p>
+            <a:pPr lvl="1"/>
+            <a:r>
+              <a:rPr lang="en-US" dirty="0"/>
+              <a:t>F 2 0</a:t>
+            </a:r>
+          </a:p>
+          <a:p>
+            <a:pPr lvl="1"/>
+            <a:r>
+              <a:rPr lang="en-US" dirty="0"/>
+              <a:t>F 0 1</a:t>
+            </a:r>
+          </a:p>
+          <a:p>
+            <a:pPr lvl="1"/>
+            <a:r>
+              <a:rPr lang="en-US" dirty="0"/>
+              <a:t>F 1 1</a:t>
+            </a:r>
+          </a:p>
+          <a:p>
+            <a:pPr lvl="1"/>
+            <a:r>
+              <a:rPr lang="en-US" dirty="0"/>
+              <a:t>F 2 1</a:t>
+            </a:r>
+          </a:p>
+          <a:p>
+            <a:pPr lvl="1"/>
+            <a:r>
+              <a:rPr lang="en-US" dirty="0"/>
+              <a:t>F 3 1</a:t>
+            </a:r>
+          </a:p>
+          <a:p>
+            <a:endParaRPr lang="en-US" dirty="0"/>
+          </a:p>
+          <a:p>
+            <a:endParaRPr lang="en-US" dirty="0"/>
+          </a:p>
+          <a:p>
+            <a:endParaRPr lang="en-US" dirty="0"/>
+          </a:p>
+          <a:p>
+            <a:pPr marL="0" indent="0">
+              <a:buNone/>
+            </a:pPr>
+            <a:endParaRPr lang="en-US" dirty="0"/>
+          </a:p>
+          <a:p>
+            <a:endParaRPr lang="en-US" dirty="0"/>
+          </a:p>
+        </p:txBody>
+      </p:sp>
+      <p:sp>
+        <p:nvSpPr>
+          <p:cNvPr id="4" name="Rectangle 3"/>
+          <p:cNvSpPr/>
+          <p:nvPr/>
+        </p:nvSpPr>
+        <p:spPr>
+          <a:xfrm>
+            <a:off x="6167292" y="1690688"/>
+            <a:ext cx="3403601" cy="4893647"/>
+          </a:xfrm>
+          <a:prstGeom prst="rect">
+            <a:avLst/>
+          </a:prstGeom>
+        </p:spPr>
+        <p:txBody>
+          <a:bodyPr wrap="square">
+            <a:spAutoFit/>
+          </a:bodyPr>
+          <a:lstStyle/>
+          <a:p>
+            <a:pPr marL="285750" indent="-285750">
+              <a:buFont typeface="Arial" panose="020B0604020202020204" pitchFamily="34" charset="0"/>
+              <a:buChar char="•"/>
+            </a:pPr>
+            <a:r>
+              <a:rPr lang="en-US" sz="2400" dirty="0"/>
+              <a:t>Player B</a:t>
+            </a:r>
+          </a:p>
+          <a:p>
+            <a:pPr marL="742950" lvl="1" indent="-285750">
+              <a:buFont typeface="Arial" panose="020B0604020202020204" pitchFamily="34" charset="0"/>
+              <a:buChar char="•"/>
+            </a:pPr>
+            <a:r>
+              <a:rPr lang="en-US" sz="2400" dirty="0"/>
+              <a:t>D 0 0 E </a:t>
+            </a:r>
+            <a:r>
+              <a:rPr lang="en-US" sz="2400" dirty="0" err="1"/>
+              <a:t>DestroyB</a:t>
+            </a:r>
+            <a:endParaRPr lang="en-US" sz="2400" dirty="0"/>
+          </a:p>
+          <a:p>
+            <a:pPr marL="742950" lvl="1" indent="-285750">
+              <a:buFont typeface="Arial" panose="020B0604020202020204" pitchFamily="34" charset="0"/>
+              <a:buChar char="•"/>
+            </a:pPr>
+            <a:r>
+              <a:rPr lang="en-US" sz="2400" dirty="0"/>
+              <a:t>C 0 1 E </a:t>
+            </a:r>
+            <a:r>
+              <a:rPr lang="en-US" sz="2400" dirty="0" err="1"/>
+              <a:t>CruiserB</a:t>
+            </a:r>
+            <a:endParaRPr lang="en-US" sz="2400" dirty="0"/>
+          </a:p>
+          <a:p>
+            <a:pPr marL="742950" lvl="1" indent="-285750">
+              <a:buFont typeface="Arial" panose="020B0604020202020204" pitchFamily="34" charset="0"/>
+              <a:buChar char="•"/>
+            </a:pPr>
+            <a:r>
+              <a:rPr lang="en-US" sz="2400" dirty="0"/>
+              <a:t>F 9 9</a:t>
+            </a:r>
+          </a:p>
+          <a:p>
+            <a:pPr marL="742950" lvl="1" indent="-285750">
+              <a:buFont typeface="Arial" panose="020B0604020202020204" pitchFamily="34" charset="0"/>
+              <a:buChar char="•"/>
+            </a:pPr>
+            <a:r>
+              <a:rPr lang="en-US" sz="2400" dirty="0"/>
+              <a:t>F 10 10</a:t>
+            </a:r>
+          </a:p>
+          <a:p>
+            <a:pPr marL="742950" lvl="1" indent="-285750">
+              <a:buFont typeface="Arial" panose="020B0604020202020204" pitchFamily="34" charset="0"/>
+              <a:buChar char="•"/>
+            </a:pPr>
+            <a:r>
+              <a:rPr lang="en-US" sz="2400" dirty="0"/>
+              <a:t>F 9 8</a:t>
+            </a:r>
+          </a:p>
+          <a:p>
+            <a:pPr marL="742950" lvl="1" indent="-285750">
+              <a:buFont typeface="Arial" panose="020B0604020202020204" pitchFamily="34" charset="0"/>
+              <a:buChar char="•"/>
+            </a:pPr>
+            <a:r>
+              <a:rPr lang="en-US" sz="2400" dirty="0"/>
+              <a:t>F 2 4</a:t>
+            </a:r>
+          </a:p>
+          <a:p>
+            <a:pPr marL="742950" lvl="1" indent="-285750">
+              <a:buFont typeface="Arial" panose="020B0604020202020204" pitchFamily="34" charset="0"/>
+              <a:buChar char="•"/>
+            </a:pPr>
+            <a:r>
+              <a:rPr lang="en-US" sz="2400" dirty="0"/>
+              <a:t>F 2 5</a:t>
+            </a:r>
+          </a:p>
+          <a:p>
+            <a:pPr marL="742950" lvl="1" indent="-285750">
+              <a:buFont typeface="Arial" panose="020B0604020202020204" pitchFamily="34" charset="0"/>
+              <a:buChar char="•"/>
+            </a:pPr>
+            <a:r>
+              <a:rPr lang="en-US" sz="2400" dirty="0"/>
+              <a:t>F 2 6</a:t>
+            </a:r>
+          </a:p>
+          <a:p>
+            <a:pPr marL="742950" lvl="1" indent="-285750">
+              <a:buFont typeface="Arial" panose="020B0604020202020204" pitchFamily="34" charset="0"/>
+              <a:buChar char="•"/>
+            </a:pPr>
+            <a:r>
+              <a:rPr lang="en-US" sz="2400" dirty="0"/>
+              <a:t>F 3 5</a:t>
+            </a:r>
+          </a:p>
+          <a:p>
+            <a:pPr marL="742950" lvl="1" indent="-285750">
+              <a:buFont typeface="Arial" panose="020B0604020202020204" pitchFamily="34" charset="0"/>
+              <a:buChar char="•"/>
+            </a:pPr>
+            <a:r>
+              <a:rPr lang="en-US" sz="2400" dirty="0"/>
+              <a:t>F 3 2</a:t>
+            </a:r>
+          </a:p>
+          <a:p>
+            <a:pPr marL="742950" lvl="1" indent="-285750">
+              <a:buFont typeface="Arial" panose="020B0604020202020204" pitchFamily="34" charset="0"/>
+              <a:buChar char="•"/>
+            </a:pPr>
+            <a:r>
+              <a:rPr lang="en-US" sz="2400" dirty="0"/>
+              <a:t>F 3 3</a:t>
+            </a:r>
+          </a:p>
+          <a:p>
+            <a:pPr marL="742950" lvl="1" indent="-285750">
+              <a:buFont typeface="Arial" panose="020B0604020202020204" pitchFamily="34" charset="0"/>
+              <a:buChar char="•"/>
+            </a:pPr>
+            <a:r>
+              <a:rPr lang="en-US" sz="2400" dirty="0"/>
+              <a:t>F 3 4</a:t>
+            </a:r>
           </a:p>
         </p:txBody>
       </p:sp>
     </p:spTree>
     <p:extLst>
       <p:ext uri="{BB962C8B-B14F-4D97-AF65-F5344CB8AC3E}">
-        <p14:creationId xmlns:p14="http://schemas.microsoft.com/office/powerpoint/2010/main" val="3894530024"/>
+        <p14:creationId xmlns:p14="http://schemas.microsoft.com/office/powerpoint/2010/main" val="1940393625"/>
       </p:ext>
     </p:extLst>
   </p:cSld>
@@ -4671,100 +4041,78 @@
           <a:lstStyle/>
           <a:p>
             <a:r>
-              <a:rPr lang="en-US" dirty="0" smtClean="0"/>
-              <a:t>How to Play Battleship</a:t>
-            </a:r>
-            <a:endParaRPr lang="en-US" dirty="0"/>
-          </a:p>
-        </p:txBody>
-      </p:sp>
-      <p:sp>
-        <p:nvSpPr>
-          <p:cNvPr id="3" name="Content Placeholder 2"/>
-          <p:cNvSpPr>
-            <a:spLocks noGrp="1"/>
-          </p:cNvSpPr>
+              <a:rPr lang="en-US" dirty="0"/>
+              <a:t>Player 1 vs</a:t>
+            </a:r>
+            <a:br>
+              <a:rPr lang="en-US" dirty="0"/>
+            </a:br>
+            <a:r>
+              <a:rPr lang="en-US" dirty="0"/>
+              <a:t> Player 2</a:t>
+            </a:r>
+          </a:p>
+        </p:txBody>
+      </p:sp>
+      <p:pic>
+        <p:nvPicPr>
+          <p:cNvPr id="4" name="Content Placeholder 3"/>
+          <p:cNvPicPr>
+            <a:picLocks noGrp="1" noChangeAspect="1"/>
+          </p:cNvPicPr>
           <p:nvPr>
             <p:ph idx="1"/>
           </p:nvPr>
-        </p:nvSpPr>
-        <p:spPr/>
-        <p:txBody>
-          <a:bodyPr>
-            <a:normAutofit lnSpcReduction="10000"/>
+        </p:nvPicPr>
+        <p:blipFill>
+          <a:blip r:embed="rId2"/>
+          <a:stretch>
+            <a:fillRect/>
+          </a:stretch>
+        </p:blipFill>
+        <p:spPr>
+          <a:xfrm>
+            <a:off x="5065967" y="56092"/>
+            <a:ext cx="6648079" cy="6801908"/>
+          </a:xfrm>
+          <a:prstGeom prst="rect">
+            <a:avLst/>
+          </a:prstGeom>
+        </p:spPr>
+      </p:pic>
+      <p:sp>
+        <p:nvSpPr>
+          <p:cNvPr id="3" name="TextBox 2"/>
+          <p:cNvSpPr txBox="1"/>
+          <p:nvPr/>
+        </p:nvSpPr>
+        <p:spPr>
+          <a:xfrm>
+            <a:off x="572972" y="2138833"/>
+            <a:ext cx="4273740" cy="1477328"/>
+          </a:xfrm>
+          <a:prstGeom prst="rect">
+            <a:avLst/>
+          </a:prstGeom>
+          <a:noFill/>
+        </p:spPr>
+        <p:txBody>
+          <a:bodyPr wrap="square" rtlCol="0">
+            <a:spAutoFit/>
           </a:bodyPr>
           <a:lstStyle/>
           <a:p>
             <a:r>
-              <a:rPr lang="en-US" dirty="0" smtClean="0"/>
-              <a:t>When you run </a:t>
-            </a:r>
-            <a:r>
-              <a:rPr lang="en-US" dirty="0" err="1" smtClean="0"/>
-              <a:t>GameManager</a:t>
-            </a:r>
-            <a:r>
-              <a:rPr lang="en-US" dirty="0" smtClean="0"/>
-              <a:t>, a server instance will start on your local machine. Alternatively, you can simply launch my implementation as java .jar file from a console window by double clicking “Launch </a:t>
-            </a:r>
-            <a:r>
-              <a:rPr lang="en-US" dirty="0" err="1" smtClean="0"/>
-              <a:t>Dr</a:t>
-            </a:r>
-            <a:r>
-              <a:rPr lang="en-US" dirty="0" smtClean="0"/>
-              <a:t> </a:t>
-            </a:r>
-            <a:r>
-              <a:rPr lang="en-US" dirty="0" err="1" smtClean="0"/>
-              <a:t>Nykls</a:t>
-            </a:r>
-            <a:r>
-              <a:rPr lang="en-US" dirty="0" smtClean="0"/>
-              <a:t> Version.bat”</a:t>
-            </a:r>
-          </a:p>
-          <a:p>
-            <a:pPr lvl="1"/>
-            <a:r>
-              <a:rPr lang="en-US" dirty="0" smtClean="0"/>
-              <a:t>This lets you test the behavior of a fully working implementation of Battleship to see how your implementation should behave.</a:t>
-            </a:r>
-          </a:p>
-          <a:p>
-            <a:r>
-              <a:rPr lang="en-US" dirty="0" smtClean="0"/>
-              <a:t>Two Clients will joint in using </a:t>
-            </a:r>
-            <a:r>
-              <a:rPr lang="en-US" dirty="0" err="1" smtClean="0"/>
-              <a:t>PuTTy</a:t>
-            </a:r>
-            <a:endParaRPr lang="en-US" dirty="0" smtClean="0"/>
-          </a:p>
-          <a:p>
-            <a:r>
               <a:rPr lang="en-US" dirty="0"/>
-              <a:t>See “</a:t>
-            </a:r>
-            <a:r>
-              <a:rPr lang="en-US" dirty="0" smtClean="0"/>
-              <a:t>SampleInput.txt” for an example set of valid input commands two players may enter as they battle each other.</a:t>
-            </a:r>
-          </a:p>
-          <a:p>
-            <a:r>
-              <a:rPr lang="en-US" dirty="0" smtClean="0"/>
-              <a:t>Run the server and play a few games to understand what’s happening before trying to write code.</a:t>
-            </a:r>
-            <a:endParaRPr lang="en-US" dirty="0"/>
+              <a:t>Ensure you play against yourself several times before attempting to write source code. You will have to infer the software design and structure of the source code based on the behavior of the program.</a:t>
+            </a:r>
           </a:p>
         </p:txBody>
       </p:sp>
     </p:spTree>
     <p:extLst>
       <p:ext uri="{BB962C8B-B14F-4D97-AF65-F5344CB8AC3E}">
-        <p14:creationId xmlns:p14="http://schemas.microsoft.com/office/powerpoint/2010/main" val="3279062054"/>
+        <p14:creationId xmlns:p14="http://schemas.microsoft.com/office/powerpoint/2010/main" val="2902825201"/>
       </p:ext>
     </p:extLst>
   </p:cSld>
@@ -4807,43 +4155,47 @@
           <a:lstStyle/>
           <a:p>
             <a:r>
-              <a:rPr lang="en-US" dirty="0" smtClean="0"/>
-              <a:t>Run the Server</a:t>
-            </a:r>
-            <a:endParaRPr lang="en-US" dirty="0"/>
-          </a:p>
-        </p:txBody>
-      </p:sp>
-      <p:pic>
-        <p:nvPicPr>
-          <p:cNvPr id="4" name="Content Placeholder 3"/>
-          <p:cNvPicPr>
-            <a:picLocks noGrp="1" noChangeAspect="1"/>
-          </p:cNvPicPr>
+              <a:rPr lang="en-US" dirty="0"/>
+              <a:t>Input can be typed one line at a type. Each Player can do this independently.</a:t>
+            </a:r>
+          </a:p>
+        </p:txBody>
+      </p:sp>
+      <p:sp>
+        <p:nvSpPr>
+          <p:cNvPr id="3" name="Content Placeholder 2"/>
+          <p:cNvSpPr>
+            <a:spLocks noGrp="1"/>
+          </p:cNvSpPr>
           <p:nvPr>
             <p:ph idx="1"/>
           </p:nvPr>
-        </p:nvPicPr>
-        <p:blipFill>
-          <a:blip r:embed="rId2"/>
-          <a:stretch>
-            <a:fillRect/>
-          </a:stretch>
-        </p:blipFill>
-        <p:spPr>
-          <a:xfrm>
-            <a:off x="1576765" y="1825625"/>
-            <a:ext cx="9038470" cy="4351338"/>
-          </a:xfrm>
-          <a:prstGeom prst="rect">
-            <a:avLst/>
-          </a:prstGeom>
-        </p:spPr>
-      </p:pic>
+        </p:nvSpPr>
+        <p:spPr/>
+        <p:txBody>
+          <a:bodyPr>
+            <a:normAutofit/>
+          </a:bodyPr>
+          <a:lstStyle/>
+          <a:p>
+            <a:r>
+              <a:rPr lang="en-US" dirty="0"/>
+              <a:t>See PlayerA.log &amp; PlayerB.log</a:t>
+            </a:r>
+          </a:p>
+          <a:p>
+            <a:pPr lvl="1"/>
+            <a:r>
+              <a:rPr lang="en-US" dirty="0"/>
+              <a:t>Shows the board setup and each command.</a:t>
+            </a:r>
+          </a:p>
+        </p:txBody>
+      </p:sp>
     </p:spTree>
     <p:extLst>
       <p:ext uri="{BB962C8B-B14F-4D97-AF65-F5344CB8AC3E}">
-        <p14:creationId xmlns:p14="http://schemas.microsoft.com/office/powerpoint/2010/main" val="4018649901"/>
+        <p14:creationId xmlns:p14="http://schemas.microsoft.com/office/powerpoint/2010/main" val="2224489887"/>
       </p:ext>
     </p:extLst>
   </p:cSld>

</xml_diff>